<commit_message>
letter A B C
</commit_message>
<xml_diff>
--- a/FFT Far Field.pptx
+++ b/FFT Far Field.pptx
@@ -6,6 +6,7 @@
   </p:sldMasterIdLst>
   <p:sldIdLst>
     <p:sldId id="256" r:id="rId2"/>
+    <p:sldId id="257" r:id="rId3"/>
   </p:sldIdLst>
   <p:sldSz cx="12192000" cy="6858000"/>
   <p:notesSz cx="6858000" cy="9144000"/>
@@ -104,6 +105,11 @@
       </a:defRPr>
     </a:lvl9pPr>
   </p:defaultTextStyle>
+  <p:extLst>
+    <p:ext uri="{EFAFB233-063F-42B5-8137-9DF3F51BA10A}">
+      <p15:sldGuideLst xmlns:p15="http://schemas.microsoft.com/office/powerpoint/2012/main"/>
+    </p:ext>
+  </p:extLst>
 </p:presentation>
 </file>
 
@@ -3323,10 +3329,10 @@
       </p:grpSpPr>
       <p:pic>
         <p:nvPicPr>
-          <p:cNvPr id="5" name="Picture 4">
-            <a:extLst>
-              <a:ext uri="{FF2B5EF4-FFF2-40B4-BE49-F238E27FC236}">
-                <a16:creationId xmlns:a16="http://schemas.microsoft.com/office/drawing/2014/main" id="{C8E975D8-40E5-445A-8E51-7883082D3F29}"/>
+          <p:cNvPr id="7" name="Picture 6">
+            <a:extLst>
+              <a:ext uri="{FF2B5EF4-FFF2-40B4-BE49-F238E27FC236}">
+                <a16:creationId xmlns:a16="http://schemas.microsoft.com/office/drawing/2014/main" id="{45241F15-7413-4B2B-852B-7B0CCB9BBCB8}"/>
               </a:ext>
             </a:extLst>
           </p:cNvPr>
@@ -3337,66 +3343,6 @@
         </p:nvPicPr>
         <p:blipFill>
           <a:blip r:embed="rId2"/>
-          <a:stretch>
-            <a:fillRect/>
-          </a:stretch>
-        </p:blipFill>
-        <p:spPr>
-          <a:xfrm>
-            <a:off x="6096000" y="3782540"/>
-            <a:ext cx="2818650" cy="2425000"/>
-          </a:xfrm>
-          <a:prstGeom prst="rect">
-            <a:avLst/>
-          </a:prstGeom>
-        </p:spPr>
-      </p:pic>
-      <p:pic>
-        <p:nvPicPr>
-          <p:cNvPr id="6" name="Picture 5">
-            <a:extLst>
-              <a:ext uri="{FF2B5EF4-FFF2-40B4-BE49-F238E27FC236}">
-                <a16:creationId xmlns:a16="http://schemas.microsoft.com/office/drawing/2014/main" id="{40DA8ADE-46B7-4924-8C68-D653BF6B56B4}"/>
-              </a:ext>
-            </a:extLst>
-          </p:cNvPr>
-          <p:cNvPicPr>
-            <a:picLocks noChangeAspect="1"/>
-          </p:cNvPicPr>
-          <p:nvPr/>
-        </p:nvPicPr>
-        <p:blipFill>
-          <a:blip r:embed="rId3"/>
-          <a:stretch>
-            <a:fillRect/>
-          </a:stretch>
-        </p:blipFill>
-        <p:spPr>
-          <a:xfrm>
-            <a:off x="6096000" y="1260058"/>
-            <a:ext cx="2818650" cy="2425000"/>
-          </a:xfrm>
-          <a:prstGeom prst="rect">
-            <a:avLst/>
-          </a:prstGeom>
-        </p:spPr>
-      </p:pic>
-      <p:pic>
-        <p:nvPicPr>
-          <p:cNvPr id="7" name="Picture 6">
-            <a:extLst>
-              <a:ext uri="{FF2B5EF4-FFF2-40B4-BE49-F238E27FC236}">
-                <a16:creationId xmlns:a16="http://schemas.microsoft.com/office/drawing/2014/main" id="{45241F15-7413-4B2B-852B-7B0CCB9BBCB8}"/>
-              </a:ext>
-            </a:extLst>
-          </p:cNvPr>
-          <p:cNvPicPr>
-            <a:picLocks noChangeAspect="1"/>
-          </p:cNvPicPr>
-          <p:nvPr/>
-        </p:nvPicPr>
-        <p:blipFill>
-          <a:blip r:embed="rId4"/>
           <a:stretch>
             <a:fillRect/>
           </a:stretch>
@@ -3425,7 +3371,7 @@
         </p:nvSpPr>
         <p:spPr>
           <a:xfrm>
-            <a:off x="4939860" y="359773"/>
+            <a:off x="4204137" y="298002"/>
             <a:ext cx="3026981" cy="646331"/>
           </a:xfrm>
           <a:prstGeom prst="rect">
@@ -3462,7 +3408,7 @@
           <p:nvPr/>
         </p:nvPicPr>
         <p:blipFill>
-          <a:blip r:embed="rId5"/>
+          <a:blip r:embed="rId3"/>
           <a:stretch>
             <a:fillRect/>
           </a:stretch>
@@ -3491,8 +3437,8 @@
         </p:nvSpPr>
         <p:spPr>
           <a:xfrm>
-            <a:off x="493986" y="2149392"/>
-            <a:ext cx="2900855" cy="646331"/>
+            <a:off x="99017" y="2097669"/>
+            <a:ext cx="3197170" cy="646331"/>
           </a:xfrm>
           <a:prstGeom prst="rect">
             <a:avLst/>
@@ -3507,7 +3453,7 @@
           <a:p>
             <a:r>
               <a:rPr lang="en-US" dirty="0"/>
-              <a:t>Near Field Intensity and phase of the laser array</a:t>
+              <a:t>Near Field Intensity (Uniform) and phase of the laser array</a:t>
             </a:r>
           </a:p>
         </p:txBody>
@@ -3547,8 +3493,8 @@
           </a:p>
         </p:txBody>
       </p:sp>
-      <mc:AlternateContent xmlns:mc="http://schemas.openxmlformats.org/markup-compatibility/2006">
-        <mc:Choice xmlns:a14="http://schemas.microsoft.com/office/drawing/2010/main" Requires="a14">
+      <mc:AlternateContent xmlns:mc="http://schemas.openxmlformats.org/markup-compatibility/2006" xmlns:a14="http://schemas.microsoft.com/office/drawing/2010/main">
+        <mc:Choice Requires="a14">
           <p:sp>
             <p:nvSpPr>
               <p:cNvPr id="12" name="TextBox 11">
@@ -3650,7 +3596,7 @@
             </p:txBody>
           </p:sp>
         </mc:Choice>
-        <mc:Fallback>
+        <mc:Fallback xmlns="">
           <p:sp>
             <p:nvSpPr>
               <p:cNvPr id="12" name="TextBox 11">
@@ -3775,10 +3721,256 @@
           </a:p>
         </p:txBody>
       </p:sp>
+      <p:pic>
+        <p:nvPicPr>
+          <p:cNvPr id="2" name="Picture 1">
+            <a:extLst>
+              <a:ext uri="{FF2B5EF4-FFF2-40B4-BE49-F238E27FC236}">
+                <a16:creationId xmlns:a16="http://schemas.microsoft.com/office/drawing/2014/main" id="{41BBA946-6D4B-49BC-8594-D35E613628C3}"/>
+              </a:ext>
+            </a:extLst>
+          </p:cNvPr>
+          <p:cNvPicPr>
+            <a:picLocks noChangeAspect="1"/>
+          </p:cNvPicPr>
+          <p:nvPr/>
+        </p:nvPicPr>
+        <p:blipFill>
+          <a:blip r:embed="rId7"/>
+          <a:stretch>
+            <a:fillRect/>
+          </a:stretch>
+        </p:blipFill>
+        <p:spPr>
+          <a:xfrm>
+            <a:off x="6096000" y="3782540"/>
+            <a:ext cx="2818650" cy="2425000"/>
+          </a:xfrm>
+          <a:prstGeom prst="rect">
+            <a:avLst/>
+          </a:prstGeom>
+        </p:spPr>
+      </p:pic>
+      <p:pic>
+        <p:nvPicPr>
+          <p:cNvPr id="3" name="Picture 2">
+            <a:extLst>
+              <a:ext uri="{FF2B5EF4-FFF2-40B4-BE49-F238E27FC236}">
+                <a16:creationId xmlns:a16="http://schemas.microsoft.com/office/drawing/2014/main" id="{0DB9E1BD-BBA9-4312-96F5-3E7930051EEE}"/>
+              </a:ext>
+            </a:extLst>
+          </p:cNvPr>
+          <p:cNvPicPr>
+            <a:picLocks noChangeAspect="1"/>
+          </p:cNvPicPr>
+          <p:nvPr/>
+        </p:nvPicPr>
+        <p:blipFill>
+          <a:blip r:embed="rId8"/>
+          <a:stretch>
+            <a:fillRect/>
+          </a:stretch>
+        </p:blipFill>
+        <p:spPr>
+          <a:xfrm>
+            <a:off x="6099179" y="1082069"/>
+            <a:ext cx="2818650" cy="2425000"/>
+          </a:xfrm>
+          <a:prstGeom prst="rect">
+            <a:avLst/>
+          </a:prstGeom>
+        </p:spPr>
+      </p:pic>
     </p:spTree>
     <p:extLst>
       <p:ext uri="{BB962C8B-B14F-4D97-AF65-F5344CB8AC3E}">
         <p14:creationId xmlns:p14="http://schemas.microsoft.com/office/powerpoint/2010/main" val="2431667849"/>
+      </p:ext>
+    </p:extLst>
+  </p:cSld>
+  <p:clrMapOvr>
+    <a:masterClrMapping/>
+  </p:clrMapOvr>
+</p:sld>
+</file>
+
+<file path=ppt/slides/slide2.xml><?xml version="1.0" encoding="utf-8"?>
+<p:sld xmlns:a="http://schemas.openxmlformats.org/drawingml/2006/main" xmlns:r="http://schemas.openxmlformats.org/officeDocument/2006/relationships" xmlns:p="http://schemas.openxmlformats.org/presentationml/2006/main">
+  <p:cSld>
+    <p:spTree>
+      <p:nvGrpSpPr>
+        <p:cNvPr id="1" name=""/>
+        <p:cNvGrpSpPr/>
+        <p:nvPr/>
+      </p:nvGrpSpPr>
+      <p:grpSpPr>
+        <a:xfrm>
+          <a:off x="0" y="0"/>
+          <a:ext cx="0" cy="0"/>
+          <a:chOff x="0" y="0"/>
+          <a:chExt cx="0" cy="0"/>
+        </a:xfrm>
+      </p:grpSpPr>
+      <p:pic>
+        <p:nvPicPr>
+          <p:cNvPr id="6" name="Picture 5">
+            <a:extLst>
+              <a:ext uri="{FF2B5EF4-FFF2-40B4-BE49-F238E27FC236}">
+                <a16:creationId xmlns:a16="http://schemas.microsoft.com/office/drawing/2014/main" id="{7EE5F754-92CC-49FD-8A16-C96BD7BD3EE2}"/>
+              </a:ext>
+            </a:extLst>
+          </p:cNvPr>
+          <p:cNvPicPr>
+            <a:picLocks noChangeAspect="1"/>
+          </p:cNvPicPr>
+          <p:nvPr/>
+        </p:nvPicPr>
+        <p:blipFill>
+          <a:blip r:embed="rId2"/>
+          <a:stretch>
+            <a:fillRect/>
+          </a:stretch>
+        </p:blipFill>
+        <p:spPr>
+          <a:xfrm>
+            <a:off x="2186466" y="1231128"/>
+            <a:ext cx="2818650" cy="2425000"/>
+          </a:xfrm>
+          <a:prstGeom prst="rect">
+            <a:avLst/>
+          </a:prstGeom>
+        </p:spPr>
+      </p:pic>
+      <p:pic>
+        <p:nvPicPr>
+          <p:cNvPr id="8" name="Picture 7">
+            <a:extLst>
+              <a:ext uri="{FF2B5EF4-FFF2-40B4-BE49-F238E27FC236}">
+                <a16:creationId xmlns:a16="http://schemas.microsoft.com/office/drawing/2014/main" id="{7AC71C59-3DDE-419F-AE97-CD49108C2ACC}"/>
+              </a:ext>
+            </a:extLst>
+          </p:cNvPr>
+          <p:cNvPicPr>
+            <a:picLocks noChangeAspect="1"/>
+          </p:cNvPicPr>
+          <p:nvPr/>
+        </p:nvPicPr>
+        <p:blipFill>
+          <a:blip r:embed="rId3"/>
+          <a:stretch>
+            <a:fillRect/>
+          </a:stretch>
+        </p:blipFill>
+        <p:spPr>
+          <a:xfrm>
+            <a:off x="5198404" y="1231128"/>
+            <a:ext cx="2818650" cy="2425000"/>
+          </a:xfrm>
+          <a:prstGeom prst="rect">
+            <a:avLst/>
+          </a:prstGeom>
+        </p:spPr>
+      </p:pic>
+      <p:pic>
+        <p:nvPicPr>
+          <p:cNvPr id="9" name="Picture 8">
+            <a:extLst>
+              <a:ext uri="{FF2B5EF4-FFF2-40B4-BE49-F238E27FC236}">
+                <a16:creationId xmlns:a16="http://schemas.microsoft.com/office/drawing/2014/main" id="{0ED250F9-BFB1-4035-8513-53EC9BEE24C9}"/>
+              </a:ext>
+            </a:extLst>
+          </p:cNvPr>
+          <p:cNvPicPr>
+            <a:picLocks noChangeAspect="1"/>
+          </p:cNvPicPr>
+          <p:nvPr/>
+        </p:nvPicPr>
+        <p:blipFill>
+          <a:blip r:embed="rId4"/>
+          <a:stretch>
+            <a:fillRect/>
+          </a:stretch>
+        </p:blipFill>
+        <p:spPr>
+          <a:xfrm>
+            <a:off x="2186466" y="3656128"/>
+            <a:ext cx="2818650" cy="2425000"/>
+          </a:xfrm>
+          <a:prstGeom prst="rect">
+            <a:avLst/>
+          </a:prstGeom>
+        </p:spPr>
+      </p:pic>
+      <p:pic>
+        <p:nvPicPr>
+          <p:cNvPr id="10" name="Picture 9">
+            <a:extLst>
+              <a:ext uri="{FF2B5EF4-FFF2-40B4-BE49-F238E27FC236}">
+                <a16:creationId xmlns:a16="http://schemas.microsoft.com/office/drawing/2014/main" id="{CFF2BCA7-DF69-48BC-931D-81F27A3AFB14}"/>
+              </a:ext>
+            </a:extLst>
+          </p:cNvPr>
+          <p:cNvPicPr>
+            <a:picLocks noChangeAspect="1"/>
+          </p:cNvPicPr>
+          <p:nvPr/>
+        </p:nvPicPr>
+        <p:blipFill>
+          <a:blip r:embed="rId5"/>
+          <a:stretch>
+            <a:fillRect/>
+          </a:stretch>
+        </p:blipFill>
+        <p:spPr>
+          <a:xfrm>
+            <a:off x="5198404" y="3656128"/>
+            <a:ext cx="2818650" cy="2425000"/>
+          </a:xfrm>
+          <a:prstGeom prst="rect">
+            <a:avLst/>
+          </a:prstGeom>
+        </p:spPr>
+      </p:pic>
+      <p:sp>
+        <p:nvSpPr>
+          <p:cNvPr id="11" name="TextBox 10">
+            <a:extLst>
+              <a:ext uri="{FF2B5EF4-FFF2-40B4-BE49-F238E27FC236}">
+                <a16:creationId xmlns:a16="http://schemas.microsoft.com/office/drawing/2014/main" id="{E45983A3-CE75-47E1-892F-D9CA24EDB0DF}"/>
+              </a:ext>
+            </a:extLst>
+          </p:cNvPr>
+          <p:cNvSpPr txBox="1"/>
+          <p:nvPr/>
+        </p:nvSpPr>
+        <p:spPr>
+          <a:xfrm>
+            <a:off x="3684913" y="334606"/>
+            <a:ext cx="3026981" cy="646331"/>
+          </a:xfrm>
+          <a:prstGeom prst="rect">
+            <a:avLst/>
+          </a:prstGeom>
+          <a:noFill/>
+        </p:spPr>
+        <p:txBody>
+          <a:bodyPr wrap="square" rtlCol="0">
+            <a:spAutoFit/>
+          </a:bodyPr>
+          <a:lstStyle/>
+          <a:p>
+            <a:pPr algn="ctr"/>
+            <a:r>
+              <a:rPr lang="en-US" b="1" dirty="0"/>
+              <a:t>Far Field Image Generation (20 by 20 laser sites) </a:t>
+            </a:r>
+          </a:p>
+        </p:txBody>
+      </p:sp>
+    </p:spTree>
+    <p:extLst>
+      <p:ext uri="{BB962C8B-B14F-4D97-AF65-F5344CB8AC3E}">
+        <p14:creationId xmlns:p14="http://schemas.microsoft.com/office/powerpoint/2010/main" val="3173298639"/>
       </p:ext>
     </p:extLst>
   </p:cSld>

</xml_diff>

<commit_message>
Intensity design near field
</commit_message>
<xml_diff>
--- a/FFT Far Field.pptx
+++ b/FFT Far Field.pptx
@@ -7,6 +7,9 @@
   <p:sldIdLst>
     <p:sldId id="256" r:id="rId2"/>
     <p:sldId id="257" r:id="rId3"/>
+    <p:sldId id="258" r:id="rId4"/>
+    <p:sldId id="259" r:id="rId5"/>
+    <p:sldId id="260" r:id="rId6"/>
   </p:sldIdLst>
   <p:sldSz cx="12192000" cy="6858000"/>
   <p:notesSz cx="6858000" cy="9144000"/>
@@ -260,7 +263,7 @@
           <a:p>
             <a:fld id="{142476D8-0C1D-4175-ACDE-A25183D502B6}" type="datetimeFigureOut">
               <a:rPr lang="en-US" smtClean="0"/>
-              <a:t>4/28/2020</a:t>
+              <a:t>5/4/2020</a:t>
             </a:fld>
             <a:endParaRPr lang="en-US"/>
           </a:p>
@@ -458,7 +461,7 @@
           <a:p>
             <a:fld id="{142476D8-0C1D-4175-ACDE-A25183D502B6}" type="datetimeFigureOut">
               <a:rPr lang="en-US" smtClean="0"/>
-              <a:t>4/28/2020</a:t>
+              <a:t>5/4/2020</a:t>
             </a:fld>
             <a:endParaRPr lang="en-US"/>
           </a:p>
@@ -666,7 +669,7 @@
           <a:p>
             <a:fld id="{142476D8-0C1D-4175-ACDE-A25183D502B6}" type="datetimeFigureOut">
               <a:rPr lang="en-US" smtClean="0"/>
-              <a:t>4/28/2020</a:t>
+              <a:t>5/4/2020</a:t>
             </a:fld>
             <a:endParaRPr lang="en-US"/>
           </a:p>
@@ -864,7 +867,7 @@
           <a:p>
             <a:fld id="{142476D8-0C1D-4175-ACDE-A25183D502B6}" type="datetimeFigureOut">
               <a:rPr lang="en-US" smtClean="0"/>
-              <a:t>4/28/2020</a:t>
+              <a:t>5/4/2020</a:t>
             </a:fld>
             <a:endParaRPr lang="en-US"/>
           </a:p>
@@ -1139,7 +1142,7 @@
           <a:p>
             <a:fld id="{142476D8-0C1D-4175-ACDE-A25183D502B6}" type="datetimeFigureOut">
               <a:rPr lang="en-US" smtClean="0"/>
-              <a:t>4/28/2020</a:t>
+              <a:t>5/4/2020</a:t>
             </a:fld>
             <a:endParaRPr lang="en-US"/>
           </a:p>
@@ -1404,7 +1407,7 @@
           <a:p>
             <a:fld id="{142476D8-0C1D-4175-ACDE-A25183D502B6}" type="datetimeFigureOut">
               <a:rPr lang="en-US" smtClean="0"/>
-              <a:t>4/28/2020</a:t>
+              <a:t>5/4/2020</a:t>
             </a:fld>
             <a:endParaRPr lang="en-US"/>
           </a:p>
@@ -1816,7 +1819,7 @@
           <a:p>
             <a:fld id="{142476D8-0C1D-4175-ACDE-A25183D502B6}" type="datetimeFigureOut">
               <a:rPr lang="en-US" smtClean="0"/>
-              <a:t>4/28/2020</a:t>
+              <a:t>5/4/2020</a:t>
             </a:fld>
             <a:endParaRPr lang="en-US"/>
           </a:p>
@@ -1957,7 +1960,7 @@
           <a:p>
             <a:fld id="{142476D8-0C1D-4175-ACDE-A25183D502B6}" type="datetimeFigureOut">
               <a:rPr lang="en-US" smtClean="0"/>
-              <a:t>4/28/2020</a:t>
+              <a:t>5/4/2020</a:t>
             </a:fld>
             <a:endParaRPr lang="en-US"/>
           </a:p>
@@ -2070,7 +2073,7 @@
           <a:p>
             <a:fld id="{142476D8-0C1D-4175-ACDE-A25183D502B6}" type="datetimeFigureOut">
               <a:rPr lang="en-US" smtClean="0"/>
-              <a:t>4/28/2020</a:t>
+              <a:t>5/4/2020</a:t>
             </a:fld>
             <a:endParaRPr lang="en-US"/>
           </a:p>
@@ -2381,7 +2384,7 @@
           <a:p>
             <a:fld id="{142476D8-0C1D-4175-ACDE-A25183D502B6}" type="datetimeFigureOut">
               <a:rPr lang="en-US" smtClean="0"/>
-              <a:t>4/28/2020</a:t>
+              <a:t>5/4/2020</a:t>
             </a:fld>
             <a:endParaRPr lang="en-US"/>
           </a:p>
@@ -2669,7 +2672,7 @@
           <a:p>
             <a:fld id="{142476D8-0C1D-4175-ACDE-A25183D502B6}" type="datetimeFigureOut">
               <a:rPr lang="en-US" smtClean="0"/>
-              <a:t>4/28/2020</a:t>
+              <a:t>5/4/2020</a:t>
             </a:fld>
             <a:endParaRPr lang="en-US"/>
           </a:p>
@@ -2910,7 +2913,7 @@
           <a:p>
             <a:fld id="{142476D8-0C1D-4175-ACDE-A25183D502B6}" type="datetimeFigureOut">
               <a:rPr lang="en-US" smtClean="0"/>
-              <a:t>4/28/2020</a:t>
+              <a:t>5/4/2020</a:t>
             </a:fld>
             <a:endParaRPr lang="en-US"/>
           </a:p>
@@ -3980,6 +3983,2380 @@
 </p:sld>
 </file>
 
+<file path=ppt/slides/slide3.xml><?xml version="1.0" encoding="utf-8"?>
+<p:sld xmlns:a="http://schemas.openxmlformats.org/drawingml/2006/main" xmlns:r="http://schemas.openxmlformats.org/officeDocument/2006/relationships" xmlns:p="http://schemas.openxmlformats.org/presentationml/2006/main">
+  <p:cSld>
+    <p:spTree>
+      <p:nvGrpSpPr>
+        <p:cNvPr id="1" name=""/>
+        <p:cNvGrpSpPr/>
+        <p:nvPr/>
+      </p:nvGrpSpPr>
+      <p:grpSpPr>
+        <a:xfrm>
+          <a:off x="0" y="0"/>
+          <a:ext cx="0" cy="0"/>
+          <a:chOff x="0" y="0"/>
+          <a:chExt cx="0" cy="0"/>
+        </a:xfrm>
+      </p:grpSpPr>
+      <p:grpSp>
+        <p:nvGrpSpPr>
+          <p:cNvPr id="6" name="Group 5">
+            <a:extLst>
+              <a:ext uri="{FF2B5EF4-FFF2-40B4-BE49-F238E27FC236}">
+                <a16:creationId xmlns:a16="http://schemas.microsoft.com/office/drawing/2014/main" id="{CF1DE35F-9663-45E6-8919-94ADBDCB3E28}"/>
+              </a:ext>
+            </a:extLst>
+          </p:cNvPr>
+          <p:cNvGrpSpPr/>
+          <p:nvPr/>
+        </p:nvGrpSpPr>
+        <p:grpSpPr>
+          <a:xfrm>
+            <a:off x="6801337" y="2844571"/>
+            <a:ext cx="2709000" cy="2761843"/>
+            <a:chOff x="5504898" y="1770077"/>
+            <a:chExt cx="2709000" cy="2761843"/>
+          </a:xfrm>
+        </p:grpSpPr>
+        <p:pic>
+          <p:nvPicPr>
+            <p:cNvPr id="4" name="Picture 3">
+              <a:extLst>
+                <a:ext uri="{FF2B5EF4-FFF2-40B4-BE49-F238E27FC236}">
+                  <a16:creationId xmlns:a16="http://schemas.microsoft.com/office/drawing/2014/main" id="{83C33C18-4721-4EB3-B1BA-04A44C6CD124}"/>
+                </a:ext>
+              </a:extLst>
+            </p:cNvPr>
+            <p:cNvPicPr>
+              <a:picLocks noChangeAspect="1"/>
+            </p:cNvPicPr>
+            <p:nvPr/>
+          </p:nvPicPr>
+          <p:blipFill>
+            <a:blip r:embed="rId2"/>
+            <a:stretch>
+              <a:fillRect/>
+            </a:stretch>
+          </p:blipFill>
+          <p:spPr>
+            <a:xfrm>
+              <a:off x="5504898" y="1990520"/>
+              <a:ext cx="2709000" cy="2541400"/>
+            </a:xfrm>
+            <a:prstGeom prst="rect">
+              <a:avLst/>
+            </a:prstGeom>
+          </p:spPr>
+        </p:pic>
+        <p:sp>
+          <p:nvSpPr>
+            <p:cNvPr id="5" name="TextBox 4">
+              <a:extLst>
+                <a:ext uri="{FF2B5EF4-FFF2-40B4-BE49-F238E27FC236}">
+                  <a16:creationId xmlns:a16="http://schemas.microsoft.com/office/drawing/2014/main" id="{DEC85C81-0A1D-446E-A502-4CE3C919E138}"/>
+                </a:ext>
+              </a:extLst>
+            </p:cNvPr>
+            <p:cNvSpPr txBox="1"/>
+            <p:nvPr/>
+          </p:nvSpPr>
+          <p:spPr>
+            <a:xfrm>
+              <a:off x="6154722" y="1770077"/>
+              <a:ext cx="1409351" cy="307777"/>
+            </a:xfrm>
+            <a:prstGeom prst="rect">
+              <a:avLst/>
+            </a:prstGeom>
+            <a:noFill/>
+          </p:spPr>
+          <p:txBody>
+            <a:bodyPr wrap="square" rtlCol="0">
+              <a:spAutoFit/>
+            </a:bodyPr>
+            <a:lstStyle/>
+            <a:p>
+              <a:r>
+                <a:rPr lang="en-US" sz="1400" dirty="0"/>
+                <a:t>A Closed loop</a:t>
+              </a:r>
+            </a:p>
+          </p:txBody>
+        </p:sp>
+      </p:grpSp>
+      <p:grpSp>
+        <p:nvGrpSpPr>
+          <p:cNvPr id="7" name="Group 6">
+            <a:extLst>
+              <a:ext uri="{FF2B5EF4-FFF2-40B4-BE49-F238E27FC236}">
+                <a16:creationId xmlns:a16="http://schemas.microsoft.com/office/drawing/2014/main" id="{BFDA0317-188F-4201-A377-C031E3130629}"/>
+              </a:ext>
+            </a:extLst>
+          </p:cNvPr>
+          <p:cNvGrpSpPr/>
+          <p:nvPr/>
+        </p:nvGrpSpPr>
+        <p:grpSpPr>
+          <a:xfrm>
+            <a:off x="7278164" y="1148306"/>
+            <a:ext cx="1507311" cy="1293689"/>
+            <a:chOff x="5733521" y="1952118"/>
+            <a:chExt cx="1507311" cy="1293689"/>
+          </a:xfrm>
+        </p:grpSpPr>
+        <p:sp>
+          <p:nvSpPr>
+            <p:cNvPr id="8" name="Oval 7">
+              <a:extLst>
+                <a:ext uri="{FF2B5EF4-FFF2-40B4-BE49-F238E27FC236}">
+                  <a16:creationId xmlns:a16="http://schemas.microsoft.com/office/drawing/2014/main" id="{95404744-D382-4BAE-B569-43A3B213B0FE}"/>
+                </a:ext>
+              </a:extLst>
+            </p:cNvPr>
+            <p:cNvSpPr/>
+            <p:nvPr/>
+          </p:nvSpPr>
+          <p:spPr>
+            <a:xfrm>
+              <a:off x="5733521" y="1952118"/>
+              <a:ext cx="138896" cy="138896"/>
+            </a:xfrm>
+            <a:prstGeom prst="ellipse">
+              <a:avLst/>
+            </a:prstGeom>
+          </p:spPr>
+          <p:style>
+            <a:lnRef idx="3">
+              <a:schemeClr val="lt1"/>
+            </a:lnRef>
+            <a:fillRef idx="1">
+              <a:schemeClr val="accent2"/>
+            </a:fillRef>
+            <a:effectRef idx="1">
+              <a:schemeClr val="accent2"/>
+            </a:effectRef>
+            <a:fontRef idx="minor">
+              <a:schemeClr val="lt1"/>
+            </a:fontRef>
+          </p:style>
+          <p:txBody>
+            <a:bodyPr rtlCol="0" anchor="ctr"/>
+            <a:lstStyle/>
+            <a:p>
+              <a:pPr algn="ctr"/>
+              <a:endParaRPr lang="en-US">
+                <a:latin typeface="Times New Roman" panose="02020603050405020304" pitchFamily="18" charset="0"/>
+                <a:cs typeface="Times New Roman" panose="02020603050405020304" pitchFamily="18" charset="0"/>
+              </a:endParaRPr>
+            </a:p>
+          </p:txBody>
+        </p:sp>
+        <p:sp>
+          <p:nvSpPr>
+            <p:cNvPr id="9" name="Oval 8">
+              <a:extLst>
+                <a:ext uri="{FF2B5EF4-FFF2-40B4-BE49-F238E27FC236}">
+                  <a16:creationId xmlns:a16="http://schemas.microsoft.com/office/drawing/2014/main" id="{215CB906-2CA8-4E2A-BF0E-F0F19D47EC14}"/>
+                </a:ext>
+              </a:extLst>
+            </p:cNvPr>
+            <p:cNvSpPr/>
+            <p:nvPr/>
+          </p:nvSpPr>
+          <p:spPr>
+            <a:xfrm>
+              <a:off x="6186863" y="1952118"/>
+              <a:ext cx="138896" cy="138896"/>
+            </a:xfrm>
+            <a:prstGeom prst="ellipse">
+              <a:avLst/>
+            </a:prstGeom>
+          </p:spPr>
+          <p:style>
+            <a:lnRef idx="3">
+              <a:schemeClr val="lt1"/>
+            </a:lnRef>
+            <a:fillRef idx="1">
+              <a:schemeClr val="accent2"/>
+            </a:fillRef>
+            <a:effectRef idx="1">
+              <a:schemeClr val="accent2"/>
+            </a:effectRef>
+            <a:fontRef idx="minor">
+              <a:schemeClr val="lt1"/>
+            </a:fontRef>
+          </p:style>
+          <p:txBody>
+            <a:bodyPr rtlCol="0" anchor="ctr"/>
+            <a:lstStyle/>
+            <a:p>
+              <a:pPr algn="ctr"/>
+              <a:endParaRPr lang="en-US">
+                <a:latin typeface="Times New Roman" panose="02020603050405020304" pitchFamily="18" charset="0"/>
+                <a:cs typeface="Times New Roman" panose="02020603050405020304" pitchFamily="18" charset="0"/>
+              </a:endParaRPr>
+            </a:p>
+          </p:txBody>
+        </p:sp>
+        <p:sp>
+          <p:nvSpPr>
+            <p:cNvPr id="10" name="Oval 9">
+              <a:extLst>
+                <a:ext uri="{FF2B5EF4-FFF2-40B4-BE49-F238E27FC236}">
+                  <a16:creationId xmlns:a16="http://schemas.microsoft.com/office/drawing/2014/main" id="{D0E27C76-0D4C-4BC3-A9A1-7A05ACEB4042}"/>
+                </a:ext>
+              </a:extLst>
+            </p:cNvPr>
+            <p:cNvSpPr/>
+            <p:nvPr/>
+          </p:nvSpPr>
+          <p:spPr>
+            <a:xfrm>
+              <a:off x="6640205" y="1952118"/>
+              <a:ext cx="138896" cy="138896"/>
+            </a:xfrm>
+            <a:prstGeom prst="ellipse">
+              <a:avLst/>
+            </a:prstGeom>
+          </p:spPr>
+          <p:style>
+            <a:lnRef idx="3">
+              <a:schemeClr val="lt1"/>
+            </a:lnRef>
+            <a:fillRef idx="1">
+              <a:schemeClr val="accent2"/>
+            </a:fillRef>
+            <a:effectRef idx="1">
+              <a:schemeClr val="accent2"/>
+            </a:effectRef>
+            <a:fontRef idx="minor">
+              <a:schemeClr val="lt1"/>
+            </a:fontRef>
+          </p:style>
+          <p:txBody>
+            <a:bodyPr rtlCol="0" anchor="ctr"/>
+            <a:lstStyle/>
+            <a:p>
+              <a:pPr algn="ctr"/>
+              <a:endParaRPr lang="en-US">
+                <a:latin typeface="Times New Roman" panose="02020603050405020304" pitchFamily="18" charset="0"/>
+                <a:cs typeface="Times New Roman" panose="02020603050405020304" pitchFamily="18" charset="0"/>
+              </a:endParaRPr>
+            </a:p>
+          </p:txBody>
+        </p:sp>
+        <p:sp>
+          <p:nvSpPr>
+            <p:cNvPr id="11" name="Oval 10">
+              <a:extLst>
+                <a:ext uri="{FF2B5EF4-FFF2-40B4-BE49-F238E27FC236}">
+                  <a16:creationId xmlns:a16="http://schemas.microsoft.com/office/drawing/2014/main" id="{66D5B397-6696-4C86-AA43-F29D805E6013}"/>
+                </a:ext>
+              </a:extLst>
+            </p:cNvPr>
+            <p:cNvSpPr/>
+            <p:nvPr/>
+          </p:nvSpPr>
+          <p:spPr>
+            <a:xfrm>
+              <a:off x="7093547" y="1952118"/>
+              <a:ext cx="138896" cy="138896"/>
+            </a:xfrm>
+            <a:prstGeom prst="ellipse">
+              <a:avLst/>
+            </a:prstGeom>
+          </p:spPr>
+          <p:style>
+            <a:lnRef idx="3">
+              <a:schemeClr val="lt1"/>
+            </a:lnRef>
+            <a:fillRef idx="1">
+              <a:schemeClr val="accent2"/>
+            </a:fillRef>
+            <a:effectRef idx="1">
+              <a:schemeClr val="accent2"/>
+            </a:effectRef>
+            <a:fontRef idx="minor">
+              <a:schemeClr val="lt1"/>
+            </a:fontRef>
+          </p:style>
+          <p:txBody>
+            <a:bodyPr rtlCol="0" anchor="ctr"/>
+            <a:lstStyle/>
+            <a:p>
+              <a:pPr algn="ctr"/>
+              <a:endParaRPr lang="en-US">
+                <a:latin typeface="Times New Roman" panose="02020603050405020304" pitchFamily="18" charset="0"/>
+                <a:cs typeface="Times New Roman" panose="02020603050405020304" pitchFamily="18" charset="0"/>
+              </a:endParaRPr>
+            </a:p>
+          </p:txBody>
+        </p:sp>
+        <p:sp>
+          <p:nvSpPr>
+            <p:cNvPr id="12" name="Oval 11">
+              <a:extLst>
+                <a:ext uri="{FF2B5EF4-FFF2-40B4-BE49-F238E27FC236}">
+                  <a16:creationId xmlns:a16="http://schemas.microsoft.com/office/drawing/2014/main" id="{B6FD5FAD-B516-4DA7-AF52-E414328F6A1D}"/>
+                </a:ext>
+              </a:extLst>
+            </p:cNvPr>
+            <p:cNvSpPr/>
+            <p:nvPr/>
+          </p:nvSpPr>
+          <p:spPr>
+            <a:xfrm>
+              <a:off x="5733521" y="2337049"/>
+              <a:ext cx="138896" cy="138896"/>
+            </a:xfrm>
+            <a:prstGeom prst="ellipse">
+              <a:avLst/>
+            </a:prstGeom>
+          </p:spPr>
+          <p:style>
+            <a:lnRef idx="3">
+              <a:schemeClr val="lt1"/>
+            </a:lnRef>
+            <a:fillRef idx="1">
+              <a:schemeClr val="accent2"/>
+            </a:fillRef>
+            <a:effectRef idx="1">
+              <a:schemeClr val="accent2"/>
+            </a:effectRef>
+            <a:fontRef idx="minor">
+              <a:schemeClr val="lt1"/>
+            </a:fontRef>
+          </p:style>
+          <p:txBody>
+            <a:bodyPr rtlCol="0" anchor="ctr"/>
+            <a:lstStyle/>
+            <a:p>
+              <a:pPr algn="ctr"/>
+              <a:endParaRPr lang="en-US">
+                <a:latin typeface="Times New Roman" panose="02020603050405020304" pitchFamily="18" charset="0"/>
+                <a:cs typeface="Times New Roman" panose="02020603050405020304" pitchFamily="18" charset="0"/>
+              </a:endParaRPr>
+            </a:p>
+          </p:txBody>
+        </p:sp>
+        <p:sp>
+          <p:nvSpPr>
+            <p:cNvPr id="13" name="Oval 12">
+              <a:extLst>
+                <a:ext uri="{FF2B5EF4-FFF2-40B4-BE49-F238E27FC236}">
+                  <a16:creationId xmlns:a16="http://schemas.microsoft.com/office/drawing/2014/main" id="{9284DD1B-EC9C-4100-AA80-595DB62E887C}"/>
+                </a:ext>
+              </a:extLst>
+            </p:cNvPr>
+            <p:cNvSpPr/>
+            <p:nvPr/>
+          </p:nvSpPr>
+          <p:spPr>
+            <a:xfrm>
+              <a:off x="6186863" y="2337049"/>
+              <a:ext cx="138896" cy="138896"/>
+            </a:xfrm>
+            <a:prstGeom prst="ellipse">
+              <a:avLst/>
+            </a:prstGeom>
+          </p:spPr>
+          <p:style>
+            <a:lnRef idx="3">
+              <a:schemeClr val="lt1"/>
+            </a:lnRef>
+            <a:fillRef idx="1">
+              <a:schemeClr val="accent2"/>
+            </a:fillRef>
+            <a:effectRef idx="1">
+              <a:schemeClr val="accent2"/>
+            </a:effectRef>
+            <a:fontRef idx="minor">
+              <a:schemeClr val="lt1"/>
+            </a:fontRef>
+          </p:style>
+          <p:txBody>
+            <a:bodyPr rtlCol="0" anchor="ctr"/>
+            <a:lstStyle/>
+            <a:p>
+              <a:pPr algn="ctr"/>
+              <a:endParaRPr lang="en-US">
+                <a:latin typeface="Times New Roman" panose="02020603050405020304" pitchFamily="18" charset="0"/>
+                <a:cs typeface="Times New Roman" panose="02020603050405020304" pitchFamily="18" charset="0"/>
+              </a:endParaRPr>
+            </a:p>
+          </p:txBody>
+        </p:sp>
+        <p:sp>
+          <p:nvSpPr>
+            <p:cNvPr id="14" name="Oval 13">
+              <a:extLst>
+                <a:ext uri="{FF2B5EF4-FFF2-40B4-BE49-F238E27FC236}">
+                  <a16:creationId xmlns:a16="http://schemas.microsoft.com/office/drawing/2014/main" id="{D9338588-3C8C-4AF6-A973-BC2E4D36531C}"/>
+                </a:ext>
+              </a:extLst>
+            </p:cNvPr>
+            <p:cNvSpPr/>
+            <p:nvPr/>
+          </p:nvSpPr>
+          <p:spPr>
+            <a:xfrm>
+              <a:off x="6640205" y="2337049"/>
+              <a:ext cx="138896" cy="138896"/>
+            </a:xfrm>
+            <a:prstGeom prst="ellipse">
+              <a:avLst/>
+            </a:prstGeom>
+          </p:spPr>
+          <p:style>
+            <a:lnRef idx="3">
+              <a:schemeClr val="lt1"/>
+            </a:lnRef>
+            <a:fillRef idx="1">
+              <a:schemeClr val="accent2"/>
+            </a:fillRef>
+            <a:effectRef idx="1">
+              <a:schemeClr val="accent2"/>
+            </a:effectRef>
+            <a:fontRef idx="minor">
+              <a:schemeClr val="lt1"/>
+            </a:fontRef>
+          </p:style>
+          <p:txBody>
+            <a:bodyPr rtlCol="0" anchor="ctr"/>
+            <a:lstStyle/>
+            <a:p>
+              <a:pPr algn="ctr"/>
+              <a:endParaRPr lang="en-US">
+                <a:latin typeface="Times New Roman" panose="02020603050405020304" pitchFamily="18" charset="0"/>
+                <a:cs typeface="Times New Roman" panose="02020603050405020304" pitchFamily="18" charset="0"/>
+              </a:endParaRPr>
+            </a:p>
+          </p:txBody>
+        </p:sp>
+        <p:sp>
+          <p:nvSpPr>
+            <p:cNvPr id="15" name="Oval 14">
+              <a:extLst>
+                <a:ext uri="{FF2B5EF4-FFF2-40B4-BE49-F238E27FC236}">
+                  <a16:creationId xmlns:a16="http://schemas.microsoft.com/office/drawing/2014/main" id="{CEFFF016-98E4-4B19-9066-2554597A619E}"/>
+                </a:ext>
+              </a:extLst>
+            </p:cNvPr>
+            <p:cNvSpPr/>
+            <p:nvPr/>
+          </p:nvSpPr>
+          <p:spPr>
+            <a:xfrm>
+              <a:off x="7093547" y="2337049"/>
+              <a:ext cx="138896" cy="138896"/>
+            </a:xfrm>
+            <a:prstGeom prst="ellipse">
+              <a:avLst/>
+            </a:prstGeom>
+          </p:spPr>
+          <p:style>
+            <a:lnRef idx="3">
+              <a:schemeClr val="lt1"/>
+            </a:lnRef>
+            <a:fillRef idx="1">
+              <a:schemeClr val="accent2"/>
+            </a:fillRef>
+            <a:effectRef idx="1">
+              <a:schemeClr val="accent2"/>
+            </a:effectRef>
+            <a:fontRef idx="minor">
+              <a:schemeClr val="lt1"/>
+            </a:fontRef>
+          </p:style>
+          <p:txBody>
+            <a:bodyPr rtlCol="0" anchor="ctr"/>
+            <a:lstStyle/>
+            <a:p>
+              <a:pPr algn="ctr"/>
+              <a:endParaRPr lang="en-US">
+                <a:latin typeface="Times New Roman" panose="02020603050405020304" pitchFamily="18" charset="0"/>
+                <a:cs typeface="Times New Roman" panose="02020603050405020304" pitchFamily="18" charset="0"/>
+              </a:endParaRPr>
+            </a:p>
+          </p:txBody>
+        </p:sp>
+        <p:sp>
+          <p:nvSpPr>
+            <p:cNvPr id="16" name="Oval 15">
+              <a:extLst>
+                <a:ext uri="{FF2B5EF4-FFF2-40B4-BE49-F238E27FC236}">
+                  <a16:creationId xmlns:a16="http://schemas.microsoft.com/office/drawing/2014/main" id="{123A44D6-E460-4BE1-A97C-DC778A8D3A6D}"/>
+                </a:ext>
+              </a:extLst>
+            </p:cNvPr>
+            <p:cNvSpPr/>
+            <p:nvPr/>
+          </p:nvSpPr>
+          <p:spPr>
+            <a:xfrm>
+              <a:off x="5733521" y="2721980"/>
+              <a:ext cx="138896" cy="138896"/>
+            </a:xfrm>
+            <a:prstGeom prst="ellipse">
+              <a:avLst/>
+            </a:prstGeom>
+          </p:spPr>
+          <p:style>
+            <a:lnRef idx="3">
+              <a:schemeClr val="lt1"/>
+            </a:lnRef>
+            <a:fillRef idx="1">
+              <a:schemeClr val="accent2"/>
+            </a:fillRef>
+            <a:effectRef idx="1">
+              <a:schemeClr val="accent2"/>
+            </a:effectRef>
+            <a:fontRef idx="minor">
+              <a:schemeClr val="lt1"/>
+            </a:fontRef>
+          </p:style>
+          <p:txBody>
+            <a:bodyPr rtlCol="0" anchor="ctr"/>
+            <a:lstStyle/>
+            <a:p>
+              <a:pPr algn="ctr"/>
+              <a:endParaRPr lang="en-US">
+                <a:latin typeface="Times New Roman" panose="02020603050405020304" pitchFamily="18" charset="0"/>
+                <a:cs typeface="Times New Roman" panose="02020603050405020304" pitchFamily="18" charset="0"/>
+              </a:endParaRPr>
+            </a:p>
+          </p:txBody>
+        </p:sp>
+        <p:sp>
+          <p:nvSpPr>
+            <p:cNvPr id="17" name="Oval 16">
+              <a:extLst>
+                <a:ext uri="{FF2B5EF4-FFF2-40B4-BE49-F238E27FC236}">
+                  <a16:creationId xmlns:a16="http://schemas.microsoft.com/office/drawing/2014/main" id="{2B47020D-D544-4852-987C-A6E13F96D39C}"/>
+                </a:ext>
+              </a:extLst>
+            </p:cNvPr>
+            <p:cNvSpPr/>
+            <p:nvPr/>
+          </p:nvSpPr>
+          <p:spPr>
+            <a:xfrm>
+              <a:off x="6186863" y="2721980"/>
+              <a:ext cx="138896" cy="138896"/>
+            </a:xfrm>
+            <a:prstGeom prst="ellipse">
+              <a:avLst/>
+            </a:prstGeom>
+          </p:spPr>
+          <p:style>
+            <a:lnRef idx="3">
+              <a:schemeClr val="lt1"/>
+            </a:lnRef>
+            <a:fillRef idx="1">
+              <a:schemeClr val="accent2"/>
+            </a:fillRef>
+            <a:effectRef idx="1">
+              <a:schemeClr val="accent2"/>
+            </a:effectRef>
+            <a:fontRef idx="minor">
+              <a:schemeClr val="lt1"/>
+            </a:fontRef>
+          </p:style>
+          <p:txBody>
+            <a:bodyPr rtlCol="0" anchor="ctr"/>
+            <a:lstStyle/>
+            <a:p>
+              <a:pPr algn="ctr"/>
+              <a:endParaRPr lang="en-US">
+                <a:latin typeface="Times New Roman" panose="02020603050405020304" pitchFamily="18" charset="0"/>
+                <a:cs typeface="Times New Roman" panose="02020603050405020304" pitchFamily="18" charset="0"/>
+              </a:endParaRPr>
+            </a:p>
+          </p:txBody>
+        </p:sp>
+        <p:sp>
+          <p:nvSpPr>
+            <p:cNvPr id="18" name="Oval 17">
+              <a:extLst>
+                <a:ext uri="{FF2B5EF4-FFF2-40B4-BE49-F238E27FC236}">
+                  <a16:creationId xmlns:a16="http://schemas.microsoft.com/office/drawing/2014/main" id="{D391E54D-4DE8-4839-A364-A94BE2046E72}"/>
+                </a:ext>
+              </a:extLst>
+            </p:cNvPr>
+            <p:cNvSpPr/>
+            <p:nvPr/>
+          </p:nvSpPr>
+          <p:spPr>
+            <a:xfrm>
+              <a:off x="6640205" y="2721980"/>
+              <a:ext cx="138896" cy="138896"/>
+            </a:xfrm>
+            <a:prstGeom prst="ellipse">
+              <a:avLst/>
+            </a:prstGeom>
+          </p:spPr>
+          <p:style>
+            <a:lnRef idx="3">
+              <a:schemeClr val="lt1"/>
+            </a:lnRef>
+            <a:fillRef idx="1">
+              <a:schemeClr val="accent2"/>
+            </a:fillRef>
+            <a:effectRef idx="1">
+              <a:schemeClr val="accent2"/>
+            </a:effectRef>
+            <a:fontRef idx="minor">
+              <a:schemeClr val="lt1"/>
+            </a:fontRef>
+          </p:style>
+          <p:txBody>
+            <a:bodyPr rtlCol="0" anchor="ctr"/>
+            <a:lstStyle/>
+            <a:p>
+              <a:pPr algn="ctr"/>
+              <a:endParaRPr lang="en-US">
+                <a:latin typeface="Times New Roman" panose="02020603050405020304" pitchFamily="18" charset="0"/>
+                <a:cs typeface="Times New Roman" panose="02020603050405020304" pitchFamily="18" charset="0"/>
+              </a:endParaRPr>
+            </a:p>
+          </p:txBody>
+        </p:sp>
+        <p:sp>
+          <p:nvSpPr>
+            <p:cNvPr id="19" name="Oval 18">
+              <a:extLst>
+                <a:ext uri="{FF2B5EF4-FFF2-40B4-BE49-F238E27FC236}">
+                  <a16:creationId xmlns:a16="http://schemas.microsoft.com/office/drawing/2014/main" id="{26D81BBC-6E9C-4AB7-A60C-68A3B9454D97}"/>
+                </a:ext>
+              </a:extLst>
+            </p:cNvPr>
+            <p:cNvSpPr/>
+            <p:nvPr/>
+          </p:nvSpPr>
+          <p:spPr>
+            <a:xfrm>
+              <a:off x="7093547" y="2721980"/>
+              <a:ext cx="138896" cy="138896"/>
+            </a:xfrm>
+            <a:prstGeom prst="ellipse">
+              <a:avLst/>
+            </a:prstGeom>
+          </p:spPr>
+          <p:style>
+            <a:lnRef idx="3">
+              <a:schemeClr val="lt1"/>
+            </a:lnRef>
+            <a:fillRef idx="1">
+              <a:schemeClr val="accent2"/>
+            </a:fillRef>
+            <a:effectRef idx="1">
+              <a:schemeClr val="accent2"/>
+            </a:effectRef>
+            <a:fontRef idx="minor">
+              <a:schemeClr val="lt1"/>
+            </a:fontRef>
+          </p:style>
+          <p:txBody>
+            <a:bodyPr rtlCol="0" anchor="ctr"/>
+            <a:lstStyle/>
+            <a:p>
+              <a:pPr algn="ctr"/>
+              <a:endParaRPr lang="en-US">
+                <a:latin typeface="Times New Roman" panose="02020603050405020304" pitchFamily="18" charset="0"/>
+                <a:cs typeface="Times New Roman" panose="02020603050405020304" pitchFamily="18" charset="0"/>
+              </a:endParaRPr>
+            </a:p>
+          </p:txBody>
+        </p:sp>
+        <p:sp>
+          <p:nvSpPr>
+            <p:cNvPr id="20" name="Oval 19">
+              <a:extLst>
+                <a:ext uri="{FF2B5EF4-FFF2-40B4-BE49-F238E27FC236}">
+                  <a16:creationId xmlns:a16="http://schemas.microsoft.com/office/drawing/2014/main" id="{1C1D6D9D-9689-4A31-8E41-9E52F2F9E478}"/>
+                </a:ext>
+              </a:extLst>
+            </p:cNvPr>
+            <p:cNvSpPr/>
+            <p:nvPr/>
+          </p:nvSpPr>
+          <p:spPr>
+            <a:xfrm>
+              <a:off x="5733521" y="3106911"/>
+              <a:ext cx="138896" cy="138896"/>
+            </a:xfrm>
+            <a:prstGeom prst="ellipse">
+              <a:avLst/>
+            </a:prstGeom>
+          </p:spPr>
+          <p:style>
+            <a:lnRef idx="3">
+              <a:schemeClr val="lt1"/>
+            </a:lnRef>
+            <a:fillRef idx="1">
+              <a:schemeClr val="accent2"/>
+            </a:fillRef>
+            <a:effectRef idx="1">
+              <a:schemeClr val="accent2"/>
+            </a:effectRef>
+            <a:fontRef idx="minor">
+              <a:schemeClr val="lt1"/>
+            </a:fontRef>
+          </p:style>
+          <p:txBody>
+            <a:bodyPr rtlCol="0" anchor="ctr"/>
+            <a:lstStyle/>
+            <a:p>
+              <a:pPr algn="ctr"/>
+              <a:endParaRPr lang="en-US">
+                <a:latin typeface="Times New Roman" panose="02020603050405020304" pitchFamily="18" charset="0"/>
+                <a:cs typeface="Times New Roman" panose="02020603050405020304" pitchFamily="18" charset="0"/>
+              </a:endParaRPr>
+            </a:p>
+          </p:txBody>
+        </p:sp>
+        <p:sp>
+          <p:nvSpPr>
+            <p:cNvPr id="21" name="Oval 20">
+              <a:extLst>
+                <a:ext uri="{FF2B5EF4-FFF2-40B4-BE49-F238E27FC236}">
+                  <a16:creationId xmlns:a16="http://schemas.microsoft.com/office/drawing/2014/main" id="{E98B553A-4436-4F36-8A13-CE150AB468C2}"/>
+                </a:ext>
+              </a:extLst>
+            </p:cNvPr>
+            <p:cNvSpPr/>
+            <p:nvPr/>
+          </p:nvSpPr>
+          <p:spPr>
+            <a:xfrm>
+              <a:off x="6186863" y="3106911"/>
+              <a:ext cx="138896" cy="138896"/>
+            </a:xfrm>
+            <a:prstGeom prst="ellipse">
+              <a:avLst/>
+            </a:prstGeom>
+          </p:spPr>
+          <p:style>
+            <a:lnRef idx="3">
+              <a:schemeClr val="lt1"/>
+            </a:lnRef>
+            <a:fillRef idx="1">
+              <a:schemeClr val="accent2"/>
+            </a:fillRef>
+            <a:effectRef idx="1">
+              <a:schemeClr val="accent2"/>
+            </a:effectRef>
+            <a:fontRef idx="minor">
+              <a:schemeClr val="lt1"/>
+            </a:fontRef>
+          </p:style>
+          <p:txBody>
+            <a:bodyPr rtlCol="0" anchor="ctr"/>
+            <a:lstStyle/>
+            <a:p>
+              <a:pPr algn="ctr"/>
+              <a:endParaRPr lang="en-US">
+                <a:latin typeface="Times New Roman" panose="02020603050405020304" pitchFamily="18" charset="0"/>
+                <a:cs typeface="Times New Roman" panose="02020603050405020304" pitchFamily="18" charset="0"/>
+              </a:endParaRPr>
+            </a:p>
+          </p:txBody>
+        </p:sp>
+        <p:sp>
+          <p:nvSpPr>
+            <p:cNvPr id="22" name="Oval 21">
+              <a:extLst>
+                <a:ext uri="{FF2B5EF4-FFF2-40B4-BE49-F238E27FC236}">
+                  <a16:creationId xmlns:a16="http://schemas.microsoft.com/office/drawing/2014/main" id="{B073E7DC-DE64-49C9-B699-BF76F561F135}"/>
+                </a:ext>
+              </a:extLst>
+            </p:cNvPr>
+            <p:cNvSpPr/>
+            <p:nvPr/>
+          </p:nvSpPr>
+          <p:spPr>
+            <a:xfrm>
+              <a:off x="6640205" y="3106911"/>
+              <a:ext cx="138896" cy="138896"/>
+            </a:xfrm>
+            <a:prstGeom prst="ellipse">
+              <a:avLst/>
+            </a:prstGeom>
+          </p:spPr>
+          <p:style>
+            <a:lnRef idx="3">
+              <a:schemeClr val="lt1"/>
+            </a:lnRef>
+            <a:fillRef idx="1">
+              <a:schemeClr val="accent2"/>
+            </a:fillRef>
+            <a:effectRef idx="1">
+              <a:schemeClr val="accent2"/>
+            </a:effectRef>
+            <a:fontRef idx="minor">
+              <a:schemeClr val="lt1"/>
+            </a:fontRef>
+          </p:style>
+          <p:txBody>
+            <a:bodyPr rtlCol="0" anchor="ctr"/>
+            <a:lstStyle/>
+            <a:p>
+              <a:pPr algn="ctr"/>
+              <a:endParaRPr lang="en-US">
+                <a:latin typeface="Times New Roman" panose="02020603050405020304" pitchFamily="18" charset="0"/>
+                <a:cs typeface="Times New Roman" panose="02020603050405020304" pitchFamily="18" charset="0"/>
+              </a:endParaRPr>
+            </a:p>
+          </p:txBody>
+        </p:sp>
+        <p:sp>
+          <p:nvSpPr>
+            <p:cNvPr id="23" name="Oval 22">
+              <a:extLst>
+                <a:ext uri="{FF2B5EF4-FFF2-40B4-BE49-F238E27FC236}">
+                  <a16:creationId xmlns:a16="http://schemas.microsoft.com/office/drawing/2014/main" id="{B52655D5-9884-41A2-B7B6-204845096096}"/>
+                </a:ext>
+              </a:extLst>
+            </p:cNvPr>
+            <p:cNvSpPr/>
+            <p:nvPr/>
+          </p:nvSpPr>
+          <p:spPr>
+            <a:xfrm>
+              <a:off x="7101936" y="3106911"/>
+              <a:ext cx="138896" cy="138896"/>
+            </a:xfrm>
+            <a:prstGeom prst="ellipse">
+              <a:avLst/>
+            </a:prstGeom>
+          </p:spPr>
+          <p:style>
+            <a:lnRef idx="3">
+              <a:schemeClr val="lt1"/>
+            </a:lnRef>
+            <a:fillRef idx="1">
+              <a:schemeClr val="accent2"/>
+            </a:fillRef>
+            <a:effectRef idx="1">
+              <a:schemeClr val="accent2"/>
+            </a:effectRef>
+            <a:fontRef idx="minor">
+              <a:schemeClr val="lt1"/>
+            </a:fontRef>
+          </p:style>
+          <p:txBody>
+            <a:bodyPr rtlCol="0" anchor="ctr"/>
+            <a:lstStyle/>
+            <a:p>
+              <a:pPr algn="ctr"/>
+              <a:endParaRPr lang="en-US">
+                <a:latin typeface="Times New Roman" panose="02020603050405020304" pitchFamily="18" charset="0"/>
+                <a:cs typeface="Times New Roman" panose="02020603050405020304" pitchFamily="18" charset="0"/>
+              </a:endParaRPr>
+            </a:p>
+          </p:txBody>
+        </p:sp>
+        <p:cxnSp>
+          <p:nvCxnSpPr>
+            <p:cNvPr id="24" name="Straight Arrow Connector 23">
+              <a:extLst>
+                <a:ext uri="{FF2B5EF4-FFF2-40B4-BE49-F238E27FC236}">
+                  <a16:creationId xmlns:a16="http://schemas.microsoft.com/office/drawing/2014/main" id="{F760687C-C972-4D0E-9ACF-D544D26C4C13}"/>
+                </a:ext>
+              </a:extLst>
+            </p:cNvPr>
+            <p:cNvCxnSpPr/>
+            <p:nvPr/>
+          </p:nvCxnSpPr>
+          <p:spPr>
+            <a:xfrm>
+              <a:off x="5878745" y="2021566"/>
+              <a:ext cx="314446" cy="0"/>
+            </a:xfrm>
+            <a:prstGeom prst="straightConnector1">
+              <a:avLst/>
+            </a:prstGeom>
+            <a:ln>
+              <a:tailEnd type="triangle"/>
+            </a:ln>
+          </p:spPr>
+          <p:style>
+            <a:lnRef idx="1">
+              <a:schemeClr val="accent1"/>
+            </a:lnRef>
+            <a:fillRef idx="0">
+              <a:schemeClr val="accent1"/>
+            </a:fillRef>
+            <a:effectRef idx="0">
+              <a:schemeClr val="accent1"/>
+            </a:effectRef>
+            <a:fontRef idx="minor">
+              <a:schemeClr val="tx1"/>
+            </a:fontRef>
+          </p:style>
+        </p:cxnSp>
+        <p:cxnSp>
+          <p:nvCxnSpPr>
+            <p:cNvPr id="25" name="Straight Arrow Connector 24">
+              <a:extLst>
+                <a:ext uri="{FF2B5EF4-FFF2-40B4-BE49-F238E27FC236}">
+                  <a16:creationId xmlns:a16="http://schemas.microsoft.com/office/drawing/2014/main" id="{42FED47D-EE6D-460E-A125-1388ED8BCC63}"/>
+                </a:ext>
+              </a:extLst>
+            </p:cNvPr>
+            <p:cNvCxnSpPr/>
+            <p:nvPr/>
+          </p:nvCxnSpPr>
+          <p:spPr>
+            <a:xfrm>
+              <a:off x="6332087" y="2021566"/>
+              <a:ext cx="314446" cy="0"/>
+            </a:xfrm>
+            <a:prstGeom prst="straightConnector1">
+              <a:avLst/>
+            </a:prstGeom>
+            <a:ln>
+              <a:tailEnd type="triangle"/>
+            </a:ln>
+          </p:spPr>
+          <p:style>
+            <a:lnRef idx="1">
+              <a:schemeClr val="accent1"/>
+            </a:lnRef>
+            <a:fillRef idx="0">
+              <a:schemeClr val="accent1"/>
+            </a:fillRef>
+            <a:effectRef idx="0">
+              <a:schemeClr val="accent1"/>
+            </a:effectRef>
+            <a:fontRef idx="minor">
+              <a:schemeClr val="tx1"/>
+            </a:fontRef>
+          </p:style>
+        </p:cxnSp>
+        <p:cxnSp>
+          <p:nvCxnSpPr>
+            <p:cNvPr id="26" name="Straight Arrow Connector 25">
+              <a:extLst>
+                <a:ext uri="{FF2B5EF4-FFF2-40B4-BE49-F238E27FC236}">
+                  <a16:creationId xmlns:a16="http://schemas.microsoft.com/office/drawing/2014/main" id="{6E8A0190-D266-41DD-B761-72DC4A764442}"/>
+                </a:ext>
+              </a:extLst>
+            </p:cNvPr>
+            <p:cNvCxnSpPr/>
+            <p:nvPr/>
+          </p:nvCxnSpPr>
+          <p:spPr>
+            <a:xfrm>
+              <a:off x="6785429" y="2021566"/>
+              <a:ext cx="314446" cy="0"/>
+            </a:xfrm>
+            <a:prstGeom prst="straightConnector1">
+              <a:avLst/>
+            </a:prstGeom>
+            <a:ln>
+              <a:tailEnd type="triangle"/>
+            </a:ln>
+          </p:spPr>
+          <p:style>
+            <a:lnRef idx="1">
+              <a:schemeClr val="accent1"/>
+            </a:lnRef>
+            <a:fillRef idx="0">
+              <a:schemeClr val="accent1"/>
+            </a:fillRef>
+            <a:effectRef idx="0">
+              <a:schemeClr val="accent1"/>
+            </a:effectRef>
+            <a:fontRef idx="minor">
+              <a:schemeClr val="tx1"/>
+            </a:fontRef>
+          </p:style>
+        </p:cxnSp>
+        <p:cxnSp>
+          <p:nvCxnSpPr>
+            <p:cNvPr id="27" name="Straight Arrow Connector 26">
+              <a:extLst>
+                <a:ext uri="{FF2B5EF4-FFF2-40B4-BE49-F238E27FC236}">
+                  <a16:creationId xmlns:a16="http://schemas.microsoft.com/office/drawing/2014/main" id="{3B5B0E0F-B8B1-442D-A5D9-EE5827651E1F}"/>
+                </a:ext>
+              </a:extLst>
+            </p:cNvPr>
+            <p:cNvCxnSpPr/>
+            <p:nvPr/>
+          </p:nvCxnSpPr>
+          <p:spPr>
+            <a:xfrm>
+              <a:off x="7169323" y="2091014"/>
+              <a:ext cx="0" cy="246035"/>
+            </a:xfrm>
+            <a:prstGeom prst="straightConnector1">
+              <a:avLst/>
+            </a:prstGeom>
+            <a:ln>
+              <a:tailEnd type="triangle"/>
+            </a:ln>
+          </p:spPr>
+          <p:style>
+            <a:lnRef idx="1">
+              <a:schemeClr val="accent1"/>
+            </a:lnRef>
+            <a:fillRef idx="0">
+              <a:schemeClr val="accent1"/>
+            </a:fillRef>
+            <a:effectRef idx="0">
+              <a:schemeClr val="accent1"/>
+            </a:effectRef>
+            <a:fontRef idx="minor">
+              <a:schemeClr val="tx1"/>
+            </a:fontRef>
+          </p:style>
+        </p:cxnSp>
+        <p:cxnSp>
+          <p:nvCxnSpPr>
+            <p:cNvPr id="28" name="Straight Arrow Connector 27">
+              <a:extLst>
+                <a:ext uri="{FF2B5EF4-FFF2-40B4-BE49-F238E27FC236}">
+                  <a16:creationId xmlns:a16="http://schemas.microsoft.com/office/drawing/2014/main" id="{0B079B43-49BD-420E-A967-60ABB371095C}"/>
+                </a:ext>
+              </a:extLst>
+            </p:cNvPr>
+            <p:cNvCxnSpPr/>
+            <p:nvPr/>
+          </p:nvCxnSpPr>
+          <p:spPr>
+            <a:xfrm flipH="1">
+              <a:off x="6779101" y="2406497"/>
+              <a:ext cx="314446" cy="0"/>
+            </a:xfrm>
+            <a:prstGeom prst="straightConnector1">
+              <a:avLst/>
+            </a:prstGeom>
+            <a:ln>
+              <a:tailEnd type="triangle"/>
+            </a:ln>
+          </p:spPr>
+          <p:style>
+            <a:lnRef idx="1">
+              <a:schemeClr val="accent1"/>
+            </a:lnRef>
+            <a:fillRef idx="0">
+              <a:schemeClr val="accent1"/>
+            </a:fillRef>
+            <a:effectRef idx="0">
+              <a:schemeClr val="accent1"/>
+            </a:effectRef>
+            <a:fontRef idx="minor">
+              <a:schemeClr val="tx1"/>
+            </a:fontRef>
+          </p:style>
+        </p:cxnSp>
+        <p:cxnSp>
+          <p:nvCxnSpPr>
+            <p:cNvPr id="29" name="Straight Arrow Connector 28">
+              <a:extLst>
+                <a:ext uri="{FF2B5EF4-FFF2-40B4-BE49-F238E27FC236}">
+                  <a16:creationId xmlns:a16="http://schemas.microsoft.com/office/drawing/2014/main" id="{09DDD1AB-50C2-4696-B4D0-55DE2E890682}"/>
+                </a:ext>
+              </a:extLst>
+            </p:cNvPr>
+            <p:cNvCxnSpPr/>
+            <p:nvPr/>
+          </p:nvCxnSpPr>
+          <p:spPr>
+            <a:xfrm flipH="1">
+              <a:off x="6325759" y="2412053"/>
+              <a:ext cx="314446" cy="0"/>
+            </a:xfrm>
+            <a:prstGeom prst="straightConnector1">
+              <a:avLst/>
+            </a:prstGeom>
+            <a:ln>
+              <a:tailEnd type="triangle"/>
+            </a:ln>
+          </p:spPr>
+          <p:style>
+            <a:lnRef idx="1">
+              <a:schemeClr val="accent1"/>
+            </a:lnRef>
+            <a:fillRef idx="0">
+              <a:schemeClr val="accent1"/>
+            </a:fillRef>
+            <a:effectRef idx="0">
+              <a:schemeClr val="accent1"/>
+            </a:effectRef>
+            <a:fontRef idx="minor">
+              <a:schemeClr val="tx1"/>
+            </a:fontRef>
+          </p:style>
+        </p:cxnSp>
+        <p:cxnSp>
+          <p:nvCxnSpPr>
+            <p:cNvPr id="30" name="Straight Arrow Connector 29">
+              <a:extLst>
+                <a:ext uri="{FF2B5EF4-FFF2-40B4-BE49-F238E27FC236}">
+                  <a16:creationId xmlns:a16="http://schemas.microsoft.com/office/drawing/2014/main" id="{1FD5C41B-94E1-44F2-9AFE-C2434EB679B6}"/>
+                </a:ext>
+              </a:extLst>
+            </p:cNvPr>
+            <p:cNvCxnSpPr/>
+            <p:nvPr/>
+          </p:nvCxnSpPr>
+          <p:spPr>
+            <a:xfrm>
+              <a:off x="6261019" y="2475945"/>
+              <a:ext cx="0" cy="246035"/>
+            </a:xfrm>
+            <a:prstGeom prst="straightConnector1">
+              <a:avLst/>
+            </a:prstGeom>
+            <a:ln>
+              <a:tailEnd type="triangle"/>
+            </a:ln>
+          </p:spPr>
+          <p:style>
+            <a:lnRef idx="1">
+              <a:schemeClr val="accent1"/>
+            </a:lnRef>
+            <a:fillRef idx="0">
+              <a:schemeClr val="accent1"/>
+            </a:fillRef>
+            <a:effectRef idx="0">
+              <a:schemeClr val="accent1"/>
+            </a:effectRef>
+            <a:fontRef idx="minor">
+              <a:schemeClr val="tx1"/>
+            </a:fontRef>
+          </p:style>
+        </p:cxnSp>
+        <p:cxnSp>
+          <p:nvCxnSpPr>
+            <p:cNvPr id="31" name="Straight Arrow Connector 30">
+              <a:extLst>
+                <a:ext uri="{FF2B5EF4-FFF2-40B4-BE49-F238E27FC236}">
+                  <a16:creationId xmlns:a16="http://schemas.microsoft.com/office/drawing/2014/main" id="{DF52651C-DF73-4CDB-8593-1AE5C003F3ED}"/>
+                </a:ext>
+              </a:extLst>
+            </p:cNvPr>
+            <p:cNvCxnSpPr/>
+            <p:nvPr/>
+          </p:nvCxnSpPr>
+          <p:spPr>
+            <a:xfrm>
+              <a:off x="6325759" y="2795758"/>
+              <a:ext cx="314446" cy="0"/>
+            </a:xfrm>
+            <a:prstGeom prst="straightConnector1">
+              <a:avLst/>
+            </a:prstGeom>
+            <a:ln>
+              <a:tailEnd type="triangle"/>
+            </a:ln>
+          </p:spPr>
+          <p:style>
+            <a:lnRef idx="1">
+              <a:schemeClr val="accent1"/>
+            </a:lnRef>
+            <a:fillRef idx="0">
+              <a:schemeClr val="accent1"/>
+            </a:fillRef>
+            <a:effectRef idx="0">
+              <a:schemeClr val="accent1"/>
+            </a:effectRef>
+            <a:fontRef idx="minor">
+              <a:schemeClr val="tx1"/>
+            </a:fontRef>
+          </p:style>
+        </p:cxnSp>
+        <p:cxnSp>
+          <p:nvCxnSpPr>
+            <p:cNvPr id="32" name="Straight Arrow Connector 31">
+              <a:extLst>
+                <a:ext uri="{FF2B5EF4-FFF2-40B4-BE49-F238E27FC236}">
+                  <a16:creationId xmlns:a16="http://schemas.microsoft.com/office/drawing/2014/main" id="{F3D58532-5020-48B8-A36E-40EFF562B2A7}"/>
+                </a:ext>
+              </a:extLst>
+            </p:cNvPr>
+            <p:cNvCxnSpPr/>
+            <p:nvPr/>
+          </p:nvCxnSpPr>
+          <p:spPr>
+            <a:xfrm>
+              <a:off x="6779101" y="2795758"/>
+              <a:ext cx="314446" cy="0"/>
+            </a:xfrm>
+            <a:prstGeom prst="straightConnector1">
+              <a:avLst/>
+            </a:prstGeom>
+            <a:ln>
+              <a:tailEnd type="triangle"/>
+            </a:ln>
+          </p:spPr>
+          <p:style>
+            <a:lnRef idx="1">
+              <a:schemeClr val="accent1"/>
+            </a:lnRef>
+            <a:fillRef idx="0">
+              <a:schemeClr val="accent1"/>
+            </a:fillRef>
+            <a:effectRef idx="0">
+              <a:schemeClr val="accent1"/>
+            </a:effectRef>
+            <a:fontRef idx="minor">
+              <a:schemeClr val="tx1"/>
+            </a:fontRef>
+          </p:style>
+        </p:cxnSp>
+        <p:cxnSp>
+          <p:nvCxnSpPr>
+            <p:cNvPr id="33" name="Straight Arrow Connector 32">
+              <a:extLst>
+                <a:ext uri="{FF2B5EF4-FFF2-40B4-BE49-F238E27FC236}">
+                  <a16:creationId xmlns:a16="http://schemas.microsoft.com/office/drawing/2014/main" id="{4C5B49BE-C038-4353-9212-AFF2CAEF73D3}"/>
+                </a:ext>
+              </a:extLst>
+            </p:cNvPr>
+            <p:cNvCxnSpPr/>
+            <p:nvPr/>
+          </p:nvCxnSpPr>
+          <p:spPr>
+            <a:xfrm>
+              <a:off x="7169323" y="2860876"/>
+              <a:ext cx="0" cy="246035"/>
+            </a:xfrm>
+            <a:prstGeom prst="straightConnector1">
+              <a:avLst/>
+            </a:prstGeom>
+            <a:ln>
+              <a:tailEnd type="triangle"/>
+            </a:ln>
+          </p:spPr>
+          <p:style>
+            <a:lnRef idx="1">
+              <a:schemeClr val="accent1"/>
+            </a:lnRef>
+            <a:fillRef idx="0">
+              <a:schemeClr val="accent1"/>
+            </a:fillRef>
+            <a:effectRef idx="0">
+              <a:schemeClr val="accent1"/>
+            </a:effectRef>
+            <a:fontRef idx="minor">
+              <a:schemeClr val="tx1"/>
+            </a:fontRef>
+          </p:style>
+        </p:cxnSp>
+        <p:cxnSp>
+          <p:nvCxnSpPr>
+            <p:cNvPr id="34" name="Straight Arrow Connector 33">
+              <a:extLst>
+                <a:ext uri="{FF2B5EF4-FFF2-40B4-BE49-F238E27FC236}">
+                  <a16:creationId xmlns:a16="http://schemas.microsoft.com/office/drawing/2014/main" id="{B304C64D-616C-4C8A-89DA-E840153A7A97}"/>
+                </a:ext>
+              </a:extLst>
+            </p:cNvPr>
+            <p:cNvCxnSpPr/>
+            <p:nvPr/>
+          </p:nvCxnSpPr>
+          <p:spPr>
+            <a:xfrm flipH="1">
+              <a:off x="6779101" y="3174593"/>
+              <a:ext cx="314446" cy="0"/>
+            </a:xfrm>
+            <a:prstGeom prst="straightConnector1">
+              <a:avLst/>
+            </a:prstGeom>
+            <a:ln>
+              <a:tailEnd type="triangle"/>
+            </a:ln>
+          </p:spPr>
+          <p:style>
+            <a:lnRef idx="1">
+              <a:schemeClr val="accent1"/>
+            </a:lnRef>
+            <a:fillRef idx="0">
+              <a:schemeClr val="accent1"/>
+            </a:fillRef>
+            <a:effectRef idx="0">
+              <a:schemeClr val="accent1"/>
+            </a:effectRef>
+            <a:fontRef idx="minor">
+              <a:schemeClr val="tx1"/>
+            </a:fontRef>
+          </p:style>
+        </p:cxnSp>
+        <p:cxnSp>
+          <p:nvCxnSpPr>
+            <p:cNvPr id="35" name="Straight Arrow Connector 34">
+              <a:extLst>
+                <a:ext uri="{FF2B5EF4-FFF2-40B4-BE49-F238E27FC236}">
+                  <a16:creationId xmlns:a16="http://schemas.microsoft.com/office/drawing/2014/main" id="{BEADCC4D-30E5-4A01-AE73-A96C628E3793}"/>
+                </a:ext>
+              </a:extLst>
+            </p:cNvPr>
+            <p:cNvCxnSpPr/>
+            <p:nvPr/>
+          </p:nvCxnSpPr>
+          <p:spPr>
+            <a:xfrm flipH="1">
+              <a:off x="6325759" y="3180149"/>
+              <a:ext cx="314446" cy="0"/>
+            </a:xfrm>
+            <a:prstGeom prst="straightConnector1">
+              <a:avLst/>
+            </a:prstGeom>
+            <a:ln>
+              <a:tailEnd type="triangle"/>
+            </a:ln>
+          </p:spPr>
+          <p:style>
+            <a:lnRef idx="1">
+              <a:schemeClr val="accent1"/>
+            </a:lnRef>
+            <a:fillRef idx="0">
+              <a:schemeClr val="accent1"/>
+            </a:fillRef>
+            <a:effectRef idx="0">
+              <a:schemeClr val="accent1"/>
+            </a:effectRef>
+            <a:fontRef idx="minor">
+              <a:schemeClr val="tx1"/>
+            </a:fontRef>
+          </p:style>
+        </p:cxnSp>
+        <p:cxnSp>
+          <p:nvCxnSpPr>
+            <p:cNvPr id="36" name="Straight Arrow Connector 35">
+              <a:extLst>
+                <a:ext uri="{FF2B5EF4-FFF2-40B4-BE49-F238E27FC236}">
+                  <a16:creationId xmlns:a16="http://schemas.microsoft.com/office/drawing/2014/main" id="{BC1DB863-A368-429C-922D-41FA57591894}"/>
+                </a:ext>
+              </a:extLst>
+            </p:cNvPr>
+            <p:cNvCxnSpPr/>
+            <p:nvPr/>
+          </p:nvCxnSpPr>
+          <p:spPr>
+            <a:xfrm flipH="1">
+              <a:off x="5872417" y="3186245"/>
+              <a:ext cx="314446" cy="0"/>
+            </a:xfrm>
+            <a:prstGeom prst="straightConnector1">
+              <a:avLst/>
+            </a:prstGeom>
+            <a:ln>
+              <a:tailEnd type="triangle"/>
+            </a:ln>
+          </p:spPr>
+          <p:style>
+            <a:lnRef idx="1">
+              <a:schemeClr val="accent1"/>
+            </a:lnRef>
+            <a:fillRef idx="0">
+              <a:schemeClr val="accent1"/>
+            </a:fillRef>
+            <a:effectRef idx="0">
+              <a:schemeClr val="accent1"/>
+            </a:effectRef>
+            <a:fontRef idx="minor">
+              <a:schemeClr val="tx1"/>
+            </a:fontRef>
+          </p:style>
+        </p:cxnSp>
+        <p:cxnSp>
+          <p:nvCxnSpPr>
+            <p:cNvPr id="37" name="Straight Arrow Connector 36">
+              <a:extLst>
+                <a:ext uri="{FF2B5EF4-FFF2-40B4-BE49-F238E27FC236}">
+                  <a16:creationId xmlns:a16="http://schemas.microsoft.com/office/drawing/2014/main" id="{3841E72B-AFCF-4261-BF19-12232FFB65E0}"/>
+                </a:ext>
+              </a:extLst>
+            </p:cNvPr>
+            <p:cNvCxnSpPr>
+              <a:stCxn id="20" idx="0"/>
+              <a:endCxn id="16" idx="4"/>
+            </p:cNvCxnSpPr>
+            <p:nvPr/>
+          </p:nvCxnSpPr>
+          <p:spPr>
+            <a:xfrm flipV="1">
+              <a:off x="5802969" y="2860876"/>
+              <a:ext cx="0" cy="246035"/>
+            </a:xfrm>
+            <a:prstGeom prst="straightConnector1">
+              <a:avLst/>
+            </a:prstGeom>
+            <a:ln>
+              <a:tailEnd type="triangle"/>
+            </a:ln>
+          </p:spPr>
+          <p:style>
+            <a:lnRef idx="1">
+              <a:schemeClr val="accent1"/>
+            </a:lnRef>
+            <a:fillRef idx="0">
+              <a:schemeClr val="accent1"/>
+            </a:fillRef>
+            <a:effectRef idx="0">
+              <a:schemeClr val="accent1"/>
+            </a:effectRef>
+            <a:fontRef idx="minor">
+              <a:schemeClr val="tx1"/>
+            </a:fontRef>
+          </p:style>
+        </p:cxnSp>
+        <p:cxnSp>
+          <p:nvCxnSpPr>
+            <p:cNvPr id="38" name="Straight Arrow Connector 37">
+              <a:extLst>
+                <a:ext uri="{FF2B5EF4-FFF2-40B4-BE49-F238E27FC236}">
+                  <a16:creationId xmlns:a16="http://schemas.microsoft.com/office/drawing/2014/main" id="{EF2FE64D-2BE7-42E9-BF16-44A3C54F4735}"/>
+                </a:ext>
+              </a:extLst>
+            </p:cNvPr>
+            <p:cNvCxnSpPr/>
+            <p:nvPr/>
+          </p:nvCxnSpPr>
+          <p:spPr>
+            <a:xfrm flipV="1">
+              <a:off x="5802969" y="2475945"/>
+              <a:ext cx="0" cy="246035"/>
+            </a:xfrm>
+            <a:prstGeom prst="straightConnector1">
+              <a:avLst/>
+            </a:prstGeom>
+            <a:ln>
+              <a:tailEnd type="triangle"/>
+            </a:ln>
+          </p:spPr>
+          <p:style>
+            <a:lnRef idx="1">
+              <a:schemeClr val="accent1"/>
+            </a:lnRef>
+            <a:fillRef idx="0">
+              <a:schemeClr val="accent1"/>
+            </a:fillRef>
+            <a:effectRef idx="0">
+              <a:schemeClr val="accent1"/>
+            </a:effectRef>
+            <a:fontRef idx="minor">
+              <a:schemeClr val="tx1"/>
+            </a:fontRef>
+          </p:style>
+        </p:cxnSp>
+        <p:cxnSp>
+          <p:nvCxnSpPr>
+            <p:cNvPr id="39" name="Straight Arrow Connector 38">
+              <a:extLst>
+                <a:ext uri="{FF2B5EF4-FFF2-40B4-BE49-F238E27FC236}">
+                  <a16:creationId xmlns:a16="http://schemas.microsoft.com/office/drawing/2014/main" id="{4A388365-5008-4199-BB40-5DC2D12214C9}"/>
+                </a:ext>
+              </a:extLst>
+            </p:cNvPr>
+            <p:cNvCxnSpPr/>
+            <p:nvPr/>
+          </p:nvCxnSpPr>
+          <p:spPr>
+            <a:xfrm flipV="1">
+              <a:off x="5789851" y="2091014"/>
+              <a:ext cx="0" cy="246035"/>
+            </a:xfrm>
+            <a:prstGeom prst="straightConnector1">
+              <a:avLst/>
+            </a:prstGeom>
+            <a:ln>
+              <a:tailEnd type="triangle"/>
+            </a:ln>
+          </p:spPr>
+          <p:style>
+            <a:lnRef idx="1">
+              <a:schemeClr val="accent1"/>
+            </a:lnRef>
+            <a:fillRef idx="0">
+              <a:schemeClr val="accent1"/>
+            </a:fillRef>
+            <a:effectRef idx="0">
+              <a:schemeClr val="accent1"/>
+            </a:effectRef>
+            <a:fontRef idx="minor">
+              <a:schemeClr val="tx1"/>
+            </a:fontRef>
+          </p:style>
+        </p:cxnSp>
+      </p:grpSp>
+      <p:pic>
+        <p:nvPicPr>
+          <p:cNvPr id="40" name="Picture 39">
+            <a:extLst>
+              <a:ext uri="{FF2B5EF4-FFF2-40B4-BE49-F238E27FC236}">
+                <a16:creationId xmlns:a16="http://schemas.microsoft.com/office/drawing/2014/main" id="{35F1E49E-BB13-47A4-BD73-B0BC4DEDB18A}"/>
+              </a:ext>
+            </a:extLst>
+          </p:cNvPr>
+          <p:cNvPicPr>
+            <a:picLocks noChangeAspect="1"/>
+          </p:cNvPicPr>
+          <p:nvPr/>
+        </p:nvPicPr>
+        <p:blipFill>
+          <a:blip r:embed="rId3"/>
+          <a:stretch>
+            <a:fillRect/>
+          </a:stretch>
+        </p:blipFill>
+        <p:spPr>
+          <a:xfrm>
+            <a:off x="1871127" y="3152348"/>
+            <a:ext cx="2818650" cy="2425000"/>
+          </a:xfrm>
+          <a:prstGeom prst="rect">
+            <a:avLst/>
+          </a:prstGeom>
+        </p:spPr>
+      </p:pic>
+      <p:sp>
+        <p:nvSpPr>
+          <p:cNvPr id="41" name="Arrow: Right 40">
+            <a:extLst>
+              <a:ext uri="{FF2B5EF4-FFF2-40B4-BE49-F238E27FC236}">
+                <a16:creationId xmlns:a16="http://schemas.microsoft.com/office/drawing/2014/main" id="{B26009DF-326B-41A3-9170-48D1EA043FD0}"/>
+              </a:ext>
+            </a:extLst>
+          </p:cNvPr>
+          <p:cNvSpPr/>
+          <p:nvPr/>
+        </p:nvSpPr>
+        <p:spPr>
+          <a:xfrm>
+            <a:off x="4949505" y="4060272"/>
+            <a:ext cx="1851832" cy="427838"/>
+          </a:xfrm>
+          <a:prstGeom prst="rightArrow">
+            <a:avLst/>
+          </a:prstGeom>
+        </p:spPr>
+        <p:style>
+          <a:lnRef idx="2">
+            <a:schemeClr val="accent1">
+              <a:shade val="50000"/>
+            </a:schemeClr>
+          </a:lnRef>
+          <a:fillRef idx="1">
+            <a:schemeClr val="accent1"/>
+          </a:fillRef>
+          <a:effectRef idx="0">
+            <a:schemeClr val="accent1"/>
+          </a:effectRef>
+          <a:fontRef idx="minor">
+            <a:schemeClr val="lt1"/>
+          </a:fontRef>
+        </p:style>
+        <p:txBody>
+          <a:bodyPr rtlCol="0" anchor="ctr"/>
+          <a:lstStyle/>
+          <a:p>
+            <a:pPr algn="ctr"/>
+            <a:endParaRPr lang="en-US"/>
+          </a:p>
+        </p:txBody>
+      </p:sp>
+      <p:sp>
+        <p:nvSpPr>
+          <p:cNvPr id="42" name="TextBox 41">
+            <a:extLst>
+              <a:ext uri="{FF2B5EF4-FFF2-40B4-BE49-F238E27FC236}">
+                <a16:creationId xmlns:a16="http://schemas.microsoft.com/office/drawing/2014/main" id="{16C7E81E-4E47-4F73-9178-E3F72A7D82D0}"/>
+              </a:ext>
+            </a:extLst>
+          </p:cNvPr>
+          <p:cNvSpPr txBox="1"/>
+          <p:nvPr/>
+        </p:nvSpPr>
+        <p:spPr>
+          <a:xfrm>
+            <a:off x="5033395" y="3721718"/>
+            <a:ext cx="1889783" cy="338554"/>
+          </a:xfrm>
+          <a:prstGeom prst="rect">
+            <a:avLst/>
+          </a:prstGeom>
+          <a:noFill/>
+        </p:spPr>
+        <p:txBody>
+          <a:bodyPr wrap="square" rtlCol="0">
+            <a:spAutoFit/>
+          </a:bodyPr>
+          <a:lstStyle/>
+          <a:p>
+            <a:r>
+              <a:rPr lang="en-US" sz="1600" dirty="0"/>
+              <a:t>Retrieve the loop?</a:t>
+            </a:r>
+          </a:p>
+        </p:txBody>
+      </p:sp>
+      <p:sp>
+        <p:nvSpPr>
+          <p:cNvPr id="43" name="TextBox 42">
+            <a:extLst>
+              <a:ext uri="{FF2B5EF4-FFF2-40B4-BE49-F238E27FC236}">
+                <a16:creationId xmlns:a16="http://schemas.microsoft.com/office/drawing/2014/main" id="{EC8CD73F-36CB-434E-A584-AB9812487695}"/>
+              </a:ext>
+            </a:extLst>
+          </p:cNvPr>
+          <p:cNvSpPr txBox="1"/>
+          <p:nvPr/>
+        </p:nvSpPr>
+        <p:spPr>
+          <a:xfrm>
+            <a:off x="3684913" y="334606"/>
+            <a:ext cx="3026981" cy="646331"/>
+          </a:xfrm>
+          <a:prstGeom prst="rect">
+            <a:avLst/>
+          </a:prstGeom>
+          <a:noFill/>
+        </p:spPr>
+        <p:txBody>
+          <a:bodyPr wrap="square" rtlCol="0">
+            <a:spAutoFit/>
+          </a:bodyPr>
+          <a:lstStyle/>
+          <a:p>
+            <a:pPr algn="ctr"/>
+            <a:r>
+              <a:rPr lang="en-US" b="1" dirty="0"/>
+              <a:t>From the phase map to imaginary gauge field design</a:t>
+            </a:r>
+          </a:p>
+        </p:txBody>
+      </p:sp>
+      <p:sp>
+        <p:nvSpPr>
+          <p:cNvPr id="50" name="TextBox 49">
+            <a:extLst>
+              <a:ext uri="{FF2B5EF4-FFF2-40B4-BE49-F238E27FC236}">
+                <a16:creationId xmlns:a16="http://schemas.microsoft.com/office/drawing/2014/main" id="{EEEF044E-F1A9-4358-A3F4-BDC83475DDAD}"/>
+              </a:ext>
+            </a:extLst>
+          </p:cNvPr>
+          <p:cNvSpPr txBox="1"/>
+          <p:nvPr/>
+        </p:nvSpPr>
+        <p:spPr>
+          <a:xfrm>
+            <a:off x="2253409" y="2726460"/>
+            <a:ext cx="2097874" cy="338554"/>
+          </a:xfrm>
+          <a:prstGeom prst="rect">
+            <a:avLst/>
+          </a:prstGeom>
+          <a:noFill/>
+        </p:spPr>
+        <p:txBody>
+          <a:bodyPr wrap="square" rtlCol="0">
+            <a:spAutoFit/>
+          </a:bodyPr>
+          <a:lstStyle/>
+          <a:p>
+            <a:r>
+              <a:rPr lang="en-US" sz="1600" dirty="0"/>
+              <a:t>Retrieved the phase</a:t>
+            </a:r>
+          </a:p>
+        </p:txBody>
+      </p:sp>
+    </p:spTree>
+    <p:extLst>
+      <p:ext uri="{BB962C8B-B14F-4D97-AF65-F5344CB8AC3E}">
+        <p14:creationId xmlns:p14="http://schemas.microsoft.com/office/powerpoint/2010/main" val="1491963213"/>
+      </p:ext>
+    </p:extLst>
+  </p:cSld>
+  <p:clrMapOvr>
+    <a:masterClrMapping/>
+  </p:clrMapOvr>
+</p:sld>
+</file>
+
+<file path=ppt/slides/slide4.xml><?xml version="1.0" encoding="utf-8"?>
+<p:sld xmlns:a="http://schemas.openxmlformats.org/drawingml/2006/main" xmlns:r="http://schemas.openxmlformats.org/officeDocument/2006/relationships" xmlns:p="http://schemas.openxmlformats.org/presentationml/2006/main">
+  <p:cSld>
+    <p:spTree>
+      <p:nvGrpSpPr>
+        <p:cNvPr id="1" name=""/>
+        <p:cNvGrpSpPr/>
+        <p:nvPr/>
+      </p:nvGrpSpPr>
+      <p:grpSpPr>
+        <a:xfrm>
+          <a:off x="0" y="0"/>
+          <a:ext cx="0" cy="0"/>
+          <a:chOff x="0" y="0"/>
+          <a:chExt cx="0" cy="0"/>
+        </a:xfrm>
+      </p:grpSpPr>
+      <p:grpSp>
+        <p:nvGrpSpPr>
+          <p:cNvPr id="4" name="Group 3">
+            <a:extLst>
+              <a:ext uri="{FF2B5EF4-FFF2-40B4-BE49-F238E27FC236}">
+                <a16:creationId xmlns:a16="http://schemas.microsoft.com/office/drawing/2014/main" id="{E3F1E72C-A82A-4FD0-BF06-956449F91B22}"/>
+              </a:ext>
+            </a:extLst>
+          </p:cNvPr>
+          <p:cNvGrpSpPr/>
+          <p:nvPr/>
+        </p:nvGrpSpPr>
+        <p:grpSpPr>
+          <a:xfrm>
+            <a:off x="1871986" y="703936"/>
+            <a:ext cx="2709000" cy="2746434"/>
+            <a:chOff x="5504898" y="1785486"/>
+            <a:chExt cx="2709000" cy="2746434"/>
+          </a:xfrm>
+        </p:grpSpPr>
+        <p:pic>
+          <p:nvPicPr>
+            <p:cNvPr id="5" name="Picture 4">
+              <a:extLst>
+                <a:ext uri="{FF2B5EF4-FFF2-40B4-BE49-F238E27FC236}">
+                  <a16:creationId xmlns:a16="http://schemas.microsoft.com/office/drawing/2014/main" id="{AAF6F3B2-A05C-4980-A20F-EED628887CB6}"/>
+                </a:ext>
+              </a:extLst>
+            </p:cNvPr>
+            <p:cNvPicPr>
+              <a:picLocks noChangeAspect="1"/>
+            </p:cNvPicPr>
+            <p:nvPr/>
+          </p:nvPicPr>
+          <p:blipFill>
+            <a:blip r:embed="rId2"/>
+            <a:stretch>
+              <a:fillRect/>
+            </a:stretch>
+          </p:blipFill>
+          <p:spPr>
+            <a:xfrm>
+              <a:off x="5504898" y="1990520"/>
+              <a:ext cx="2709000" cy="2541400"/>
+            </a:xfrm>
+            <a:prstGeom prst="rect">
+              <a:avLst/>
+            </a:prstGeom>
+          </p:spPr>
+        </p:pic>
+        <p:sp>
+          <p:nvSpPr>
+            <p:cNvPr id="6" name="TextBox 5">
+              <a:extLst>
+                <a:ext uri="{FF2B5EF4-FFF2-40B4-BE49-F238E27FC236}">
+                  <a16:creationId xmlns:a16="http://schemas.microsoft.com/office/drawing/2014/main" id="{F982676C-8D44-4723-9198-E64F48CB3790}"/>
+                </a:ext>
+              </a:extLst>
+            </p:cNvPr>
+            <p:cNvSpPr txBox="1"/>
+            <p:nvPr/>
+          </p:nvSpPr>
+          <p:spPr>
+            <a:xfrm>
+              <a:off x="5991823" y="1785486"/>
+              <a:ext cx="2059176" cy="307777"/>
+            </a:xfrm>
+            <a:prstGeom prst="rect">
+              <a:avLst/>
+            </a:prstGeom>
+            <a:noFill/>
+          </p:spPr>
+          <p:txBody>
+            <a:bodyPr wrap="square" rtlCol="0">
+              <a:spAutoFit/>
+            </a:bodyPr>
+            <a:lstStyle/>
+            <a:p>
+              <a:r>
+                <a:rPr lang="en-US" sz="1400" dirty="0"/>
+                <a:t>An existed near field loop</a:t>
+              </a:r>
+            </a:p>
+          </p:txBody>
+        </p:sp>
+      </p:grpSp>
+      <p:sp>
+        <p:nvSpPr>
+          <p:cNvPr id="7" name="Arrow: Right 6">
+            <a:extLst>
+              <a:ext uri="{FF2B5EF4-FFF2-40B4-BE49-F238E27FC236}">
+                <a16:creationId xmlns:a16="http://schemas.microsoft.com/office/drawing/2014/main" id="{CDDA01AC-AE15-4BE9-8A21-F62B6AF1BFAA}"/>
+              </a:ext>
+            </a:extLst>
+          </p:cNvPr>
+          <p:cNvSpPr/>
+          <p:nvPr/>
+        </p:nvSpPr>
+        <p:spPr>
+          <a:xfrm>
+            <a:off x="5138553" y="2057520"/>
+            <a:ext cx="1851832" cy="427838"/>
+          </a:xfrm>
+          <a:prstGeom prst="rightArrow">
+            <a:avLst/>
+          </a:prstGeom>
+        </p:spPr>
+        <p:style>
+          <a:lnRef idx="2">
+            <a:schemeClr val="accent1">
+              <a:shade val="50000"/>
+            </a:schemeClr>
+          </a:lnRef>
+          <a:fillRef idx="1">
+            <a:schemeClr val="accent1"/>
+          </a:fillRef>
+          <a:effectRef idx="0">
+            <a:schemeClr val="accent1"/>
+          </a:effectRef>
+          <a:fontRef idx="minor">
+            <a:schemeClr val="lt1"/>
+          </a:fontRef>
+        </p:style>
+        <p:txBody>
+          <a:bodyPr rtlCol="0" anchor="ctr"/>
+          <a:lstStyle/>
+          <a:p>
+            <a:pPr algn="ctr"/>
+            <a:endParaRPr lang="en-US"/>
+          </a:p>
+        </p:txBody>
+      </p:sp>
+      <p:sp>
+        <p:nvSpPr>
+          <p:cNvPr id="9" name="TextBox 8">
+            <a:extLst>
+              <a:ext uri="{FF2B5EF4-FFF2-40B4-BE49-F238E27FC236}">
+                <a16:creationId xmlns:a16="http://schemas.microsoft.com/office/drawing/2014/main" id="{A9BFE3BD-715B-48AB-BD82-746FAEA698BB}"/>
+              </a:ext>
+            </a:extLst>
+          </p:cNvPr>
+          <p:cNvSpPr txBox="1"/>
+          <p:nvPr/>
+        </p:nvSpPr>
+        <p:spPr>
+          <a:xfrm>
+            <a:off x="5007313" y="1779593"/>
+            <a:ext cx="2229199" cy="338554"/>
+          </a:xfrm>
+          <a:prstGeom prst="rect">
+            <a:avLst/>
+          </a:prstGeom>
+          <a:noFill/>
+        </p:spPr>
+        <p:txBody>
+          <a:bodyPr wrap="square" rtlCol="0">
+            <a:spAutoFit/>
+          </a:bodyPr>
+          <a:lstStyle/>
+          <a:p>
+            <a:r>
+              <a:rPr lang="en-US" sz="1600" dirty="0"/>
+              <a:t>Retrieve the amplitude</a:t>
+            </a:r>
+          </a:p>
+        </p:txBody>
+      </p:sp>
+      <p:pic>
+        <p:nvPicPr>
+          <p:cNvPr id="10" name="Picture 9">
+            <a:extLst>
+              <a:ext uri="{FF2B5EF4-FFF2-40B4-BE49-F238E27FC236}">
+                <a16:creationId xmlns:a16="http://schemas.microsoft.com/office/drawing/2014/main" id="{A755DAE8-20DA-4550-A95B-49A47FAAE2E2}"/>
+              </a:ext>
+            </a:extLst>
+          </p:cNvPr>
+          <p:cNvPicPr>
+            <a:picLocks noChangeAspect="1"/>
+          </p:cNvPicPr>
+          <p:nvPr/>
+        </p:nvPicPr>
+        <p:blipFill>
+          <a:blip r:embed="rId3"/>
+          <a:stretch>
+            <a:fillRect/>
+          </a:stretch>
+        </p:blipFill>
+        <p:spPr>
+          <a:xfrm>
+            <a:off x="1871986" y="3450370"/>
+            <a:ext cx="2818650" cy="2425000"/>
+          </a:xfrm>
+          <a:prstGeom prst="rect">
+            <a:avLst/>
+          </a:prstGeom>
+        </p:spPr>
+      </p:pic>
+      <p:sp>
+        <p:nvSpPr>
+          <p:cNvPr id="11" name="TextBox 10">
+            <a:extLst>
+              <a:ext uri="{FF2B5EF4-FFF2-40B4-BE49-F238E27FC236}">
+                <a16:creationId xmlns:a16="http://schemas.microsoft.com/office/drawing/2014/main" id="{8E9B4986-1F33-4CC2-8F10-360A0DB3032F}"/>
+              </a:ext>
+            </a:extLst>
+          </p:cNvPr>
+          <p:cNvSpPr txBox="1"/>
+          <p:nvPr/>
+        </p:nvSpPr>
+        <p:spPr>
+          <a:xfrm>
+            <a:off x="3684913" y="334606"/>
+            <a:ext cx="3787942" cy="369332"/>
+          </a:xfrm>
+          <a:prstGeom prst="rect">
+            <a:avLst/>
+          </a:prstGeom>
+          <a:noFill/>
+        </p:spPr>
+        <p:txBody>
+          <a:bodyPr wrap="square" rtlCol="0">
+            <a:spAutoFit/>
+          </a:bodyPr>
+          <a:lstStyle/>
+          <a:p>
+            <a:pPr algn="ctr"/>
+            <a:r>
+              <a:rPr lang="en-US" b="1" dirty="0"/>
+              <a:t>Retrieve the amplitude of Near Field</a:t>
+            </a:r>
+          </a:p>
+        </p:txBody>
+      </p:sp>
+      <p:pic>
+        <p:nvPicPr>
+          <p:cNvPr id="12" name="Picture 11">
+            <a:extLst>
+              <a:ext uri="{FF2B5EF4-FFF2-40B4-BE49-F238E27FC236}">
+                <a16:creationId xmlns:a16="http://schemas.microsoft.com/office/drawing/2014/main" id="{A20D6FD4-66B4-4869-BB3C-26F5DC7C8773}"/>
+              </a:ext>
+            </a:extLst>
+          </p:cNvPr>
+          <p:cNvPicPr>
+            <a:picLocks noChangeAspect="1"/>
+          </p:cNvPicPr>
+          <p:nvPr/>
+        </p:nvPicPr>
+        <p:blipFill>
+          <a:blip r:embed="rId4"/>
+          <a:stretch>
+            <a:fillRect/>
+          </a:stretch>
+        </p:blipFill>
+        <p:spPr>
+          <a:xfrm>
+            <a:off x="7547952" y="845020"/>
+            <a:ext cx="2818650" cy="2425000"/>
+          </a:xfrm>
+          <a:prstGeom prst="rect">
+            <a:avLst/>
+          </a:prstGeom>
+        </p:spPr>
+      </p:pic>
+      <p:pic>
+        <p:nvPicPr>
+          <p:cNvPr id="13" name="Picture 12">
+            <a:extLst>
+              <a:ext uri="{FF2B5EF4-FFF2-40B4-BE49-F238E27FC236}">
+                <a16:creationId xmlns:a16="http://schemas.microsoft.com/office/drawing/2014/main" id="{CC1CDD41-B7CC-489A-9E4D-106FA30CCF90}"/>
+              </a:ext>
+            </a:extLst>
+          </p:cNvPr>
+          <p:cNvPicPr>
+            <a:picLocks noChangeAspect="1"/>
+          </p:cNvPicPr>
+          <p:nvPr/>
+        </p:nvPicPr>
+        <p:blipFill>
+          <a:blip r:embed="rId5"/>
+          <a:stretch>
+            <a:fillRect/>
+          </a:stretch>
+        </p:blipFill>
+        <p:spPr>
+          <a:xfrm>
+            <a:off x="7520478" y="3845604"/>
+            <a:ext cx="2818650" cy="2425000"/>
+          </a:xfrm>
+          <a:prstGeom prst="rect">
+            <a:avLst/>
+          </a:prstGeom>
+        </p:spPr>
+      </p:pic>
+      <p:sp>
+        <p:nvSpPr>
+          <p:cNvPr id="14" name="Arrow: Down 13">
+            <a:extLst>
+              <a:ext uri="{FF2B5EF4-FFF2-40B4-BE49-F238E27FC236}">
+                <a16:creationId xmlns:a16="http://schemas.microsoft.com/office/drawing/2014/main" id="{50A5772E-739F-479D-8415-CE113BE205E8}"/>
+              </a:ext>
+            </a:extLst>
+          </p:cNvPr>
+          <p:cNvSpPr/>
+          <p:nvPr/>
+        </p:nvSpPr>
+        <p:spPr>
+          <a:xfrm>
+            <a:off x="8786648" y="3195145"/>
+            <a:ext cx="294290" cy="536027"/>
+          </a:xfrm>
+          <a:prstGeom prst="downArrow">
+            <a:avLst/>
+          </a:prstGeom>
+        </p:spPr>
+        <p:style>
+          <a:lnRef idx="2">
+            <a:schemeClr val="accent1">
+              <a:shade val="50000"/>
+            </a:schemeClr>
+          </a:lnRef>
+          <a:fillRef idx="1">
+            <a:schemeClr val="accent1"/>
+          </a:fillRef>
+          <a:effectRef idx="0">
+            <a:schemeClr val="accent1"/>
+          </a:effectRef>
+          <a:fontRef idx="minor">
+            <a:schemeClr val="lt1"/>
+          </a:fontRef>
+        </p:style>
+        <p:txBody>
+          <a:bodyPr rtlCol="0" anchor="ctr"/>
+          <a:lstStyle/>
+          <a:p>
+            <a:pPr algn="ctr"/>
+            <a:endParaRPr lang="en-US"/>
+          </a:p>
+        </p:txBody>
+      </p:sp>
+      <p:sp>
+        <p:nvSpPr>
+          <p:cNvPr id="15" name="TextBox 14">
+            <a:extLst>
+              <a:ext uri="{FF2B5EF4-FFF2-40B4-BE49-F238E27FC236}">
+                <a16:creationId xmlns:a16="http://schemas.microsoft.com/office/drawing/2014/main" id="{A13B3497-4B8E-4FF9-931A-6BEAC94E2D0B}"/>
+              </a:ext>
+            </a:extLst>
+          </p:cNvPr>
+          <p:cNvSpPr txBox="1"/>
+          <p:nvPr/>
+        </p:nvSpPr>
+        <p:spPr>
+          <a:xfrm>
+            <a:off x="9080938" y="3332622"/>
+            <a:ext cx="914400" cy="338554"/>
+          </a:xfrm>
+          <a:prstGeom prst="rect">
+            <a:avLst/>
+          </a:prstGeom>
+          <a:noFill/>
+        </p:spPr>
+        <p:txBody>
+          <a:bodyPr wrap="square" rtlCol="0">
+            <a:spAutoFit/>
+          </a:bodyPr>
+          <a:lstStyle/>
+          <a:p>
+            <a:r>
+              <a:rPr lang="en-US" sz="1600" dirty="0"/>
+              <a:t>Far Field</a:t>
+            </a:r>
+          </a:p>
+        </p:txBody>
+      </p:sp>
+      <p:pic>
+        <p:nvPicPr>
+          <p:cNvPr id="17" name="Picture 16">
+            <a:extLst>
+              <a:ext uri="{FF2B5EF4-FFF2-40B4-BE49-F238E27FC236}">
+                <a16:creationId xmlns:a16="http://schemas.microsoft.com/office/drawing/2014/main" id="{A8D85C51-9229-490E-9B1E-3567604860D8}"/>
+              </a:ext>
+            </a:extLst>
+          </p:cNvPr>
+          <p:cNvPicPr>
+            <a:picLocks noChangeAspect="1"/>
+          </p:cNvPicPr>
+          <p:nvPr/>
+        </p:nvPicPr>
+        <p:blipFill>
+          <a:blip r:embed="rId6"/>
+          <a:stretch>
+            <a:fillRect/>
+          </a:stretch>
+        </p:blipFill>
+        <p:spPr>
+          <a:xfrm>
+            <a:off x="4701828" y="3128938"/>
+            <a:ext cx="2818650" cy="2425000"/>
+          </a:xfrm>
+          <a:prstGeom prst="rect">
+            <a:avLst/>
+          </a:prstGeom>
+        </p:spPr>
+      </p:pic>
+      <p:sp>
+        <p:nvSpPr>
+          <p:cNvPr id="18" name="TextBox 17">
+            <a:extLst>
+              <a:ext uri="{FF2B5EF4-FFF2-40B4-BE49-F238E27FC236}">
+                <a16:creationId xmlns:a16="http://schemas.microsoft.com/office/drawing/2014/main" id="{9673E76B-D28E-4217-98B0-7B87B677D885}"/>
+              </a:ext>
+            </a:extLst>
+          </p:cNvPr>
+          <p:cNvSpPr txBox="1"/>
+          <p:nvPr/>
+        </p:nvSpPr>
+        <p:spPr>
+          <a:xfrm>
+            <a:off x="5409097" y="2931158"/>
+            <a:ext cx="1546026" cy="369332"/>
+          </a:xfrm>
+          <a:prstGeom prst="rect">
+            <a:avLst/>
+          </a:prstGeom>
+          <a:noFill/>
+        </p:spPr>
+        <p:txBody>
+          <a:bodyPr wrap="square" rtlCol="0">
+            <a:spAutoFit/>
+          </a:bodyPr>
+          <a:lstStyle/>
+          <a:p>
+            <a:r>
+              <a:rPr lang="en-US" dirty="0"/>
+              <a:t>Desired Image</a:t>
+            </a:r>
+          </a:p>
+        </p:txBody>
+      </p:sp>
+      <p:sp>
+        <p:nvSpPr>
+          <p:cNvPr id="19" name="TextBox 18">
+            <a:extLst>
+              <a:ext uri="{FF2B5EF4-FFF2-40B4-BE49-F238E27FC236}">
+                <a16:creationId xmlns:a16="http://schemas.microsoft.com/office/drawing/2014/main" id="{395D5DA5-B501-4B7D-91B1-C893B77D4797}"/>
+              </a:ext>
+            </a:extLst>
+          </p:cNvPr>
+          <p:cNvSpPr txBox="1"/>
+          <p:nvPr/>
+        </p:nvSpPr>
+        <p:spPr>
+          <a:xfrm>
+            <a:off x="7192041" y="6156088"/>
+            <a:ext cx="4548013" cy="646331"/>
+          </a:xfrm>
+          <a:prstGeom prst="rect">
+            <a:avLst/>
+          </a:prstGeom>
+          <a:noFill/>
+        </p:spPr>
+        <p:txBody>
+          <a:bodyPr wrap="square" rtlCol="0">
+            <a:spAutoFit/>
+          </a:bodyPr>
+          <a:lstStyle/>
+          <a:p>
+            <a:r>
+              <a:rPr lang="en-US" dirty="0"/>
+              <a:t>Recovered quality is bad, because G-S is hard to converge when used to recover amplitude</a:t>
+            </a:r>
+          </a:p>
+        </p:txBody>
+      </p:sp>
+      <p:sp>
+        <p:nvSpPr>
+          <p:cNvPr id="20" name="TextBox 19">
+            <a:extLst>
+              <a:ext uri="{FF2B5EF4-FFF2-40B4-BE49-F238E27FC236}">
+                <a16:creationId xmlns:a16="http://schemas.microsoft.com/office/drawing/2014/main" id="{6E276270-E910-4AA1-BE8F-BA1379D161D4}"/>
+              </a:ext>
+            </a:extLst>
+          </p:cNvPr>
+          <p:cNvSpPr txBox="1"/>
+          <p:nvPr/>
+        </p:nvSpPr>
+        <p:spPr>
+          <a:xfrm>
+            <a:off x="1332216" y="6156088"/>
+            <a:ext cx="4548013" cy="646331"/>
+          </a:xfrm>
+          <a:prstGeom prst="rect">
+            <a:avLst/>
+          </a:prstGeom>
+          <a:noFill/>
+        </p:spPr>
+        <p:txBody>
+          <a:bodyPr wrap="square" rtlCol="0">
+            <a:spAutoFit/>
+          </a:bodyPr>
+          <a:lstStyle/>
+          <a:p>
+            <a:r>
+              <a:rPr lang="en-US" dirty="0"/>
+              <a:t>An additional phase change mechanism is need to do the inverse engineering. </a:t>
+            </a:r>
+          </a:p>
+        </p:txBody>
+      </p:sp>
+      <p:sp>
+        <p:nvSpPr>
+          <p:cNvPr id="21" name="Rectangle 20">
+            <a:extLst>
+              <a:ext uri="{FF2B5EF4-FFF2-40B4-BE49-F238E27FC236}">
+                <a16:creationId xmlns:a16="http://schemas.microsoft.com/office/drawing/2014/main" id="{FDDB8A59-2D22-4EBA-A38A-415B8028EA4E}"/>
+              </a:ext>
+            </a:extLst>
+          </p:cNvPr>
+          <p:cNvSpPr/>
+          <p:nvPr/>
+        </p:nvSpPr>
+        <p:spPr>
+          <a:xfrm>
+            <a:off x="1871986" y="703937"/>
+            <a:ext cx="2818650" cy="5436469"/>
+          </a:xfrm>
+          <a:prstGeom prst="rect">
+            <a:avLst/>
+          </a:prstGeom>
+          <a:noFill/>
+          <a:ln w="41275">
+            <a:solidFill>
+              <a:srgbClr val="FFC000"/>
+            </a:solidFill>
+          </a:ln>
+        </p:spPr>
+        <p:style>
+          <a:lnRef idx="2">
+            <a:schemeClr val="accent1">
+              <a:shade val="50000"/>
+            </a:schemeClr>
+          </a:lnRef>
+          <a:fillRef idx="1">
+            <a:schemeClr val="accent1"/>
+          </a:fillRef>
+          <a:effectRef idx="0">
+            <a:schemeClr val="accent1"/>
+          </a:effectRef>
+          <a:fontRef idx="minor">
+            <a:schemeClr val="lt1"/>
+          </a:fontRef>
+        </p:style>
+        <p:txBody>
+          <a:bodyPr rtlCol="0" anchor="ctr"/>
+          <a:lstStyle/>
+          <a:p>
+            <a:pPr algn="ctr"/>
+            <a:endParaRPr lang="en-US"/>
+          </a:p>
+        </p:txBody>
+      </p:sp>
+    </p:spTree>
+    <p:extLst>
+      <p:ext uri="{BB962C8B-B14F-4D97-AF65-F5344CB8AC3E}">
+        <p14:creationId xmlns:p14="http://schemas.microsoft.com/office/powerpoint/2010/main" val="3836274778"/>
+      </p:ext>
+    </p:extLst>
+  </p:cSld>
+  <p:clrMapOvr>
+    <a:masterClrMapping/>
+  </p:clrMapOvr>
+</p:sld>
+</file>
+
+<file path=ppt/slides/slide5.xml><?xml version="1.0" encoding="utf-8"?>
+<p:sld xmlns:a="http://schemas.openxmlformats.org/drawingml/2006/main" xmlns:r="http://schemas.openxmlformats.org/officeDocument/2006/relationships" xmlns:p="http://schemas.openxmlformats.org/presentationml/2006/main">
+  <p:cSld>
+    <p:spTree>
+      <p:nvGrpSpPr>
+        <p:cNvPr id="1" name=""/>
+        <p:cNvGrpSpPr/>
+        <p:nvPr/>
+      </p:nvGrpSpPr>
+      <p:grpSpPr>
+        <a:xfrm>
+          <a:off x="0" y="0"/>
+          <a:ext cx="0" cy="0"/>
+          <a:chOff x="0" y="0"/>
+          <a:chExt cx="0" cy="0"/>
+        </a:xfrm>
+      </p:grpSpPr>
+      <p:sp>
+        <p:nvSpPr>
+          <p:cNvPr id="5" name="TextBox 4">
+            <a:extLst>
+              <a:ext uri="{FF2B5EF4-FFF2-40B4-BE49-F238E27FC236}">
+                <a16:creationId xmlns:a16="http://schemas.microsoft.com/office/drawing/2014/main" id="{F8ABE9F1-B4F1-4D70-8A26-A217AC6C42A3}"/>
+              </a:ext>
+            </a:extLst>
+          </p:cNvPr>
+          <p:cNvSpPr txBox="1"/>
+          <p:nvPr/>
+        </p:nvSpPr>
+        <p:spPr>
+          <a:xfrm>
+            <a:off x="1517685" y="960723"/>
+            <a:ext cx="6133846" cy="1508105"/>
+          </a:xfrm>
+          <a:prstGeom prst="rect">
+            <a:avLst/>
+          </a:prstGeom>
+          <a:noFill/>
+        </p:spPr>
+        <p:txBody>
+          <a:bodyPr wrap="square" rtlCol="0">
+            <a:spAutoFit/>
+          </a:bodyPr>
+          <a:lstStyle/>
+          <a:p>
+            <a:r>
+              <a:rPr lang="en-US" sz="2000" dirty="0"/>
+              <a:t>My plan:</a:t>
+            </a:r>
+          </a:p>
+          <a:p>
+            <a:endParaRPr lang="en-US" dirty="0"/>
+          </a:p>
+          <a:p>
+            <a:pPr marL="285750" indent="-285750">
+              <a:buFont typeface="Arial" panose="020B0604020202020204" pitchFamily="34" charset="0"/>
+              <a:buChar char="•"/>
+            </a:pPr>
+            <a:r>
+              <a:rPr lang="en-US" dirty="0"/>
+              <a:t>Find the additional phase change method for the inverse engineering.</a:t>
+            </a:r>
+          </a:p>
+          <a:p>
+            <a:pPr marL="285750" indent="-285750">
+              <a:buFont typeface="Arial" panose="020B0604020202020204" pitchFamily="34" charset="0"/>
+              <a:buChar char="•"/>
+            </a:pPr>
+            <a:endParaRPr lang="en-US" dirty="0"/>
+          </a:p>
+        </p:txBody>
+      </p:sp>
+    </p:spTree>
+    <p:extLst>
+      <p:ext uri="{BB962C8B-B14F-4D97-AF65-F5344CB8AC3E}">
+        <p14:creationId xmlns:p14="http://schemas.microsoft.com/office/powerpoint/2010/main" val="1723557139"/>
+      </p:ext>
+    </p:extLst>
+  </p:cSld>
+  <p:clrMapOvr>
+    <a:masterClrMapping/>
+  </p:clrMapOvr>
+</p:sld>
+</file>
+
 <file path=ppt/theme/theme1.xml><?xml version="1.0" encoding="utf-8"?>
 <a:theme xmlns:a="http://schemas.openxmlformats.org/drawingml/2006/main" name="Office Theme">
   <a:themeElements>

</xml_diff>

<commit_message>
Inverse design first success!
</commit_message>
<xml_diff>
--- a/FFT Far Field.pptx
+++ b/FFT Far Field.pptx
@@ -10,6 +10,7 @@
     <p:sldId id="258" r:id="rId4"/>
     <p:sldId id="259" r:id="rId5"/>
     <p:sldId id="260" r:id="rId6"/>
+    <p:sldId id="261" r:id="rId7"/>
   </p:sldIdLst>
   <p:sldSz cx="12192000" cy="6858000"/>
   <p:notesSz cx="6858000" cy="9144000"/>
@@ -263,7 +264,7 @@
           <a:p>
             <a:fld id="{142476D8-0C1D-4175-ACDE-A25183D502B6}" type="datetimeFigureOut">
               <a:rPr lang="en-US" smtClean="0"/>
-              <a:t>5/4/2020</a:t>
+              <a:t>5/5/2020</a:t>
             </a:fld>
             <a:endParaRPr lang="en-US"/>
           </a:p>
@@ -461,7 +462,7 @@
           <a:p>
             <a:fld id="{142476D8-0C1D-4175-ACDE-A25183D502B6}" type="datetimeFigureOut">
               <a:rPr lang="en-US" smtClean="0"/>
-              <a:t>5/4/2020</a:t>
+              <a:t>5/5/2020</a:t>
             </a:fld>
             <a:endParaRPr lang="en-US"/>
           </a:p>
@@ -669,7 +670,7 @@
           <a:p>
             <a:fld id="{142476D8-0C1D-4175-ACDE-A25183D502B6}" type="datetimeFigureOut">
               <a:rPr lang="en-US" smtClean="0"/>
-              <a:t>5/4/2020</a:t>
+              <a:t>5/5/2020</a:t>
             </a:fld>
             <a:endParaRPr lang="en-US"/>
           </a:p>
@@ -867,7 +868,7 @@
           <a:p>
             <a:fld id="{142476D8-0C1D-4175-ACDE-A25183D502B6}" type="datetimeFigureOut">
               <a:rPr lang="en-US" smtClean="0"/>
-              <a:t>5/4/2020</a:t>
+              <a:t>5/5/2020</a:t>
             </a:fld>
             <a:endParaRPr lang="en-US"/>
           </a:p>
@@ -1142,7 +1143,7 @@
           <a:p>
             <a:fld id="{142476D8-0C1D-4175-ACDE-A25183D502B6}" type="datetimeFigureOut">
               <a:rPr lang="en-US" smtClean="0"/>
-              <a:t>5/4/2020</a:t>
+              <a:t>5/5/2020</a:t>
             </a:fld>
             <a:endParaRPr lang="en-US"/>
           </a:p>
@@ -1407,7 +1408,7 @@
           <a:p>
             <a:fld id="{142476D8-0C1D-4175-ACDE-A25183D502B6}" type="datetimeFigureOut">
               <a:rPr lang="en-US" smtClean="0"/>
-              <a:t>5/4/2020</a:t>
+              <a:t>5/5/2020</a:t>
             </a:fld>
             <a:endParaRPr lang="en-US"/>
           </a:p>
@@ -1819,7 +1820,7 @@
           <a:p>
             <a:fld id="{142476D8-0C1D-4175-ACDE-A25183D502B6}" type="datetimeFigureOut">
               <a:rPr lang="en-US" smtClean="0"/>
-              <a:t>5/4/2020</a:t>
+              <a:t>5/5/2020</a:t>
             </a:fld>
             <a:endParaRPr lang="en-US"/>
           </a:p>
@@ -1960,7 +1961,7 @@
           <a:p>
             <a:fld id="{142476D8-0C1D-4175-ACDE-A25183D502B6}" type="datetimeFigureOut">
               <a:rPr lang="en-US" smtClean="0"/>
-              <a:t>5/4/2020</a:t>
+              <a:t>5/5/2020</a:t>
             </a:fld>
             <a:endParaRPr lang="en-US"/>
           </a:p>
@@ -2073,7 +2074,7 @@
           <a:p>
             <a:fld id="{142476D8-0C1D-4175-ACDE-A25183D502B6}" type="datetimeFigureOut">
               <a:rPr lang="en-US" smtClean="0"/>
-              <a:t>5/4/2020</a:t>
+              <a:t>5/5/2020</a:t>
             </a:fld>
             <a:endParaRPr lang="en-US"/>
           </a:p>
@@ -2384,7 +2385,7 @@
           <a:p>
             <a:fld id="{142476D8-0C1D-4175-ACDE-A25183D502B6}" type="datetimeFigureOut">
               <a:rPr lang="en-US" smtClean="0"/>
-              <a:t>5/4/2020</a:t>
+              <a:t>5/5/2020</a:t>
             </a:fld>
             <a:endParaRPr lang="en-US"/>
           </a:p>
@@ -2672,7 +2673,7 @@
           <a:p>
             <a:fld id="{142476D8-0C1D-4175-ACDE-A25183D502B6}" type="datetimeFigureOut">
               <a:rPr lang="en-US" smtClean="0"/>
-              <a:t>5/4/2020</a:t>
+              <a:t>5/5/2020</a:t>
             </a:fld>
             <a:endParaRPr lang="en-US"/>
           </a:p>
@@ -2913,7 +2914,7 @@
           <a:p>
             <a:fld id="{142476D8-0C1D-4175-ACDE-A25183D502B6}" type="datetimeFigureOut">
               <a:rPr lang="en-US" smtClean="0"/>
-              <a:t>5/4/2020</a:t>
+              <a:t>5/5/2020</a:t>
             </a:fld>
             <a:endParaRPr lang="en-US"/>
           </a:p>
@@ -6357,6 +6358,872 @@
 </p:sld>
 </file>
 
+<file path=ppt/slides/slide6.xml><?xml version="1.0" encoding="utf-8"?>
+<p:sld xmlns:a="http://schemas.openxmlformats.org/drawingml/2006/main" xmlns:r="http://schemas.openxmlformats.org/officeDocument/2006/relationships" xmlns:p="http://schemas.openxmlformats.org/presentationml/2006/main">
+  <p:cSld>
+    <p:spTree>
+      <p:nvGrpSpPr>
+        <p:cNvPr id="1" name=""/>
+        <p:cNvGrpSpPr/>
+        <p:nvPr/>
+      </p:nvGrpSpPr>
+      <p:grpSpPr>
+        <a:xfrm>
+          <a:off x="0" y="0"/>
+          <a:ext cx="0" cy="0"/>
+          <a:chOff x="0" y="0"/>
+          <a:chExt cx="0" cy="0"/>
+        </a:xfrm>
+      </p:grpSpPr>
+      <p:pic>
+        <p:nvPicPr>
+          <p:cNvPr id="5" name="Picture 4">
+            <a:extLst>
+              <a:ext uri="{FF2B5EF4-FFF2-40B4-BE49-F238E27FC236}">
+                <a16:creationId xmlns:a16="http://schemas.microsoft.com/office/drawing/2014/main" id="{51F48242-3B50-4C76-BD7E-B4B376BB18C1}"/>
+              </a:ext>
+            </a:extLst>
+          </p:cNvPr>
+          <p:cNvPicPr>
+            <a:picLocks noChangeAspect="1"/>
+          </p:cNvPicPr>
+          <p:nvPr/>
+        </p:nvPicPr>
+        <p:blipFill>
+          <a:blip r:embed="rId2"/>
+          <a:stretch>
+            <a:fillRect/>
+          </a:stretch>
+        </p:blipFill>
+        <p:spPr>
+          <a:xfrm>
+            <a:off x="5315174" y="4100873"/>
+            <a:ext cx="2423752" cy="2085254"/>
+          </a:xfrm>
+          <a:prstGeom prst="rect">
+            <a:avLst/>
+          </a:prstGeom>
+        </p:spPr>
+      </p:pic>
+      <p:pic>
+        <p:nvPicPr>
+          <p:cNvPr id="7" name="Picture 6">
+            <a:extLst>
+              <a:ext uri="{FF2B5EF4-FFF2-40B4-BE49-F238E27FC236}">
+                <a16:creationId xmlns:a16="http://schemas.microsoft.com/office/drawing/2014/main" id="{2F6EE978-02A0-4EBC-9683-87370D2ADFF2}"/>
+              </a:ext>
+            </a:extLst>
+          </p:cNvPr>
+          <p:cNvPicPr>
+            <a:picLocks noChangeAspect="1"/>
+          </p:cNvPicPr>
+          <p:nvPr/>
+        </p:nvPicPr>
+        <p:blipFill>
+          <a:blip r:embed="rId3"/>
+          <a:stretch>
+            <a:fillRect/>
+          </a:stretch>
+        </p:blipFill>
+        <p:spPr>
+          <a:xfrm>
+            <a:off x="9044863" y="4100873"/>
+            <a:ext cx="2423752" cy="2085254"/>
+          </a:xfrm>
+          <a:prstGeom prst="rect">
+            <a:avLst/>
+          </a:prstGeom>
+        </p:spPr>
+      </p:pic>
+      <p:pic>
+        <p:nvPicPr>
+          <p:cNvPr id="6" name="Picture 5">
+            <a:extLst>
+              <a:ext uri="{FF2B5EF4-FFF2-40B4-BE49-F238E27FC236}">
+                <a16:creationId xmlns:a16="http://schemas.microsoft.com/office/drawing/2014/main" id="{ADB4FEDF-87F1-4F80-A7B5-8D0365D28005}"/>
+              </a:ext>
+            </a:extLst>
+          </p:cNvPr>
+          <p:cNvPicPr>
+            <a:picLocks noChangeAspect="1"/>
+          </p:cNvPicPr>
+          <p:nvPr/>
+        </p:nvPicPr>
+        <p:blipFill>
+          <a:blip r:embed="rId4"/>
+          <a:stretch>
+            <a:fillRect/>
+          </a:stretch>
+        </p:blipFill>
+        <p:spPr>
+          <a:xfrm>
+            <a:off x="1644431" y="4100873"/>
+            <a:ext cx="2423752" cy="2085254"/>
+          </a:xfrm>
+          <a:prstGeom prst="rect">
+            <a:avLst/>
+          </a:prstGeom>
+        </p:spPr>
+      </p:pic>
+      <p:sp>
+        <p:nvSpPr>
+          <p:cNvPr id="12" name="Arrow: Down 11">
+            <a:extLst>
+              <a:ext uri="{FF2B5EF4-FFF2-40B4-BE49-F238E27FC236}">
+                <a16:creationId xmlns:a16="http://schemas.microsoft.com/office/drawing/2014/main" id="{BABFACC7-A4AD-4DDE-AEB3-C5ED33E19E8A}"/>
+              </a:ext>
+            </a:extLst>
+          </p:cNvPr>
+          <p:cNvSpPr/>
+          <p:nvPr/>
+        </p:nvSpPr>
+        <p:spPr>
+          <a:xfrm>
+            <a:off x="2526214" y="3033108"/>
+            <a:ext cx="330093" cy="960699"/>
+          </a:xfrm>
+          <a:prstGeom prst="downArrow">
+            <a:avLst/>
+          </a:prstGeom>
+        </p:spPr>
+        <p:style>
+          <a:lnRef idx="2">
+            <a:schemeClr val="accent2">
+              <a:shade val="50000"/>
+            </a:schemeClr>
+          </a:lnRef>
+          <a:fillRef idx="1">
+            <a:schemeClr val="accent2"/>
+          </a:fillRef>
+          <a:effectRef idx="0">
+            <a:schemeClr val="accent2"/>
+          </a:effectRef>
+          <a:fontRef idx="minor">
+            <a:schemeClr val="lt1"/>
+          </a:fontRef>
+        </p:style>
+        <p:txBody>
+          <a:bodyPr rtlCol="0" anchor="ctr"/>
+          <a:lstStyle/>
+          <a:p>
+            <a:pPr algn="ctr"/>
+            <a:endParaRPr lang="en-US"/>
+          </a:p>
+        </p:txBody>
+      </p:sp>
+      <p:sp>
+        <p:nvSpPr>
+          <p:cNvPr id="13" name="TextBox 12">
+            <a:extLst>
+              <a:ext uri="{FF2B5EF4-FFF2-40B4-BE49-F238E27FC236}">
+                <a16:creationId xmlns:a16="http://schemas.microsoft.com/office/drawing/2014/main" id="{2FCAF1E6-2281-4F44-A28B-40E5EFFC7681}"/>
+              </a:ext>
+            </a:extLst>
+          </p:cNvPr>
+          <p:cNvSpPr txBox="1"/>
+          <p:nvPr/>
+        </p:nvSpPr>
+        <p:spPr>
+          <a:xfrm>
+            <a:off x="2954477" y="3391924"/>
+            <a:ext cx="763929" cy="369332"/>
+          </a:xfrm>
+          <a:prstGeom prst="rect">
+            <a:avLst/>
+          </a:prstGeom>
+          <a:noFill/>
+        </p:spPr>
+        <p:txBody>
+          <a:bodyPr wrap="square" rtlCol="0">
+            <a:spAutoFit/>
+          </a:bodyPr>
+          <a:lstStyle/>
+          <a:p>
+            <a:r>
+              <a:rPr lang="en-US" dirty="0"/>
+              <a:t>FFT</a:t>
+            </a:r>
+          </a:p>
+        </p:txBody>
+      </p:sp>
+      <p:grpSp>
+        <p:nvGrpSpPr>
+          <p:cNvPr id="27" name="Group 26">
+            <a:extLst>
+              <a:ext uri="{FF2B5EF4-FFF2-40B4-BE49-F238E27FC236}">
+                <a16:creationId xmlns:a16="http://schemas.microsoft.com/office/drawing/2014/main" id="{37730FDF-A034-4CA8-90D7-67ADD3963807}"/>
+              </a:ext>
+            </a:extLst>
+          </p:cNvPr>
+          <p:cNvGrpSpPr/>
+          <p:nvPr/>
+        </p:nvGrpSpPr>
+        <p:grpSpPr>
+          <a:xfrm>
+            <a:off x="432555" y="671873"/>
+            <a:ext cx="7400432" cy="2590789"/>
+            <a:chOff x="432555" y="671873"/>
+            <a:chExt cx="7400432" cy="2590789"/>
+          </a:xfrm>
+        </p:grpSpPr>
+        <p:pic>
+          <p:nvPicPr>
+            <p:cNvPr id="4" name="Picture 3">
+              <a:extLst>
+                <a:ext uri="{FF2B5EF4-FFF2-40B4-BE49-F238E27FC236}">
+                  <a16:creationId xmlns:a16="http://schemas.microsoft.com/office/drawing/2014/main" id="{5C6F4A38-A13F-4510-9871-D8FB8E43B9A6}"/>
+                </a:ext>
+              </a:extLst>
+            </p:cNvPr>
+            <p:cNvPicPr>
+              <a:picLocks noChangeAspect="1"/>
+            </p:cNvPicPr>
+            <p:nvPr/>
+          </p:nvPicPr>
+          <p:blipFill>
+            <a:blip r:embed="rId5"/>
+            <a:stretch>
+              <a:fillRect/>
+            </a:stretch>
+          </p:blipFill>
+          <p:spPr>
+            <a:xfrm>
+              <a:off x="5409235" y="849366"/>
+              <a:ext cx="2423752" cy="2085254"/>
+            </a:xfrm>
+            <a:prstGeom prst="rect">
+              <a:avLst/>
+            </a:prstGeom>
+          </p:spPr>
+        </p:pic>
+        <p:pic>
+          <p:nvPicPr>
+            <p:cNvPr id="10" name="Picture 9">
+              <a:extLst>
+                <a:ext uri="{FF2B5EF4-FFF2-40B4-BE49-F238E27FC236}">
+                  <a16:creationId xmlns:a16="http://schemas.microsoft.com/office/drawing/2014/main" id="{5C7CD33F-B008-4E51-8E86-F4D5BA3FEC04}"/>
+                </a:ext>
+              </a:extLst>
+            </p:cNvPr>
+            <p:cNvPicPr>
+              <a:picLocks noChangeAspect="1"/>
+            </p:cNvPicPr>
+            <p:nvPr/>
+          </p:nvPicPr>
+          <p:blipFill>
+            <a:blip r:embed="rId6"/>
+            <a:stretch>
+              <a:fillRect/>
+            </a:stretch>
+          </p:blipFill>
+          <p:spPr>
+            <a:xfrm>
+              <a:off x="432555" y="849366"/>
+              <a:ext cx="2423752" cy="2085254"/>
+            </a:xfrm>
+            <a:prstGeom prst="rect">
+              <a:avLst/>
+            </a:prstGeom>
+          </p:spPr>
+        </p:pic>
+        <p:pic>
+          <p:nvPicPr>
+            <p:cNvPr id="11" name="Picture 10">
+              <a:extLst>
+                <a:ext uri="{FF2B5EF4-FFF2-40B4-BE49-F238E27FC236}">
+                  <a16:creationId xmlns:a16="http://schemas.microsoft.com/office/drawing/2014/main" id="{56293165-72AB-429F-B105-D6459E82261E}"/>
+                </a:ext>
+              </a:extLst>
+            </p:cNvPr>
+            <p:cNvPicPr>
+              <a:picLocks noChangeAspect="1"/>
+            </p:cNvPicPr>
+            <p:nvPr/>
+          </p:nvPicPr>
+          <p:blipFill>
+            <a:blip r:embed="rId7"/>
+            <a:stretch>
+              <a:fillRect/>
+            </a:stretch>
+          </p:blipFill>
+          <p:spPr>
+            <a:xfrm>
+              <a:off x="2856307" y="849366"/>
+              <a:ext cx="2423752" cy="2085254"/>
+            </a:xfrm>
+            <a:prstGeom prst="rect">
+              <a:avLst/>
+            </a:prstGeom>
+          </p:spPr>
+        </p:pic>
+        <p:sp>
+          <p:nvSpPr>
+            <p:cNvPr id="14" name="Rectangle 13">
+              <a:extLst>
+                <a:ext uri="{FF2B5EF4-FFF2-40B4-BE49-F238E27FC236}">
+                  <a16:creationId xmlns:a16="http://schemas.microsoft.com/office/drawing/2014/main" id="{79923B0F-CCA2-4F45-9157-8AB12C29E576}"/>
+                </a:ext>
+              </a:extLst>
+            </p:cNvPr>
+            <p:cNvSpPr/>
+            <p:nvPr/>
+          </p:nvSpPr>
+          <p:spPr>
+            <a:xfrm>
+              <a:off x="432555" y="671873"/>
+              <a:ext cx="7400432" cy="2361235"/>
+            </a:xfrm>
+            <a:prstGeom prst="rect">
+              <a:avLst/>
+            </a:prstGeom>
+            <a:noFill/>
+            <a:ln w="25400">
+              <a:solidFill>
+                <a:srgbClr val="FFC000"/>
+              </a:solidFill>
+            </a:ln>
+          </p:spPr>
+          <p:style>
+            <a:lnRef idx="2">
+              <a:schemeClr val="accent1">
+                <a:shade val="50000"/>
+              </a:schemeClr>
+            </a:lnRef>
+            <a:fillRef idx="1">
+              <a:schemeClr val="accent1"/>
+            </a:fillRef>
+            <a:effectRef idx="0">
+              <a:schemeClr val="accent1"/>
+            </a:effectRef>
+            <a:fontRef idx="minor">
+              <a:schemeClr val="lt1"/>
+            </a:fontRef>
+          </p:style>
+          <p:txBody>
+            <a:bodyPr rtlCol="0" anchor="ctr"/>
+            <a:lstStyle/>
+            <a:p>
+              <a:pPr algn="ctr"/>
+              <a:endParaRPr lang="en-US"/>
+            </a:p>
+          </p:txBody>
+        </p:sp>
+        <p:sp>
+          <p:nvSpPr>
+            <p:cNvPr id="15" name="TextBox 14">
+              <a:extLst>
+                <a:ext uri="{FF2B5EF4-FFF2-40B4-BE49-F238E27FC236}">
+                  <a16:creationId xmlns:a16="http://schemas.microsoft.com/office/drawing/2014/main" id="{79FCDD3B-E42C-4CB6-832D-F4CA437F4C76}"/>
+                </a:ext>
+              </a:extLst>
+            </p:cNvPr>
+            <p:cNvSpPr txBox="1"/>
+            <p:nvPr/>
+          </p:nvSpPr>
+          <p:spPr>
+            <a:xfrm>
+              <a:off x="655505" y="2893330"/>
+              <a:ext cx="1266963" cy="369332"/>
+            </a:xfrm>
+            <a:prstGeom prst="rect">
+              <a:avLst/>
+            </a:prstGeom>
+            <a:solidFill>
+              <a:schemeClr val="bg1"/>
+            </a:solidFill>
+          </p:spPr>
+          <p:txBody>
+            <a:bodyPr wrap="square" rtlCol="0">
+              <a:spAutoFit/>
+            </a:bodyPr>
+            <a:lstStyle/>
+            <a:p>
+              <a:r>
+                <a:rPr lang="en-US" dirty="0"/>
+                <a:t>Near Field</a:t>
+              </a:r>
+            </a:p>
+          </p:txBody>
+        </p:sp>
+      </p:grpSp>
+      <p:sp>
+        <p:nvSpPr>
+          <p:cNvPr id="17" name="TextBox 16">
+            <a:extLst>
+              <a:ext uri="{FF2B5EF4-FFF2-40B4-BE49-F238E27FC236}">
+                <a16:creationId xmlns:a16="http://schemas.microsoft.com/office/drawing/2014/main" id="{9945D656-1804-42CE-8B36-329E18334ED6}"/>
+              </a:ext>
+            </a:extLst>
+          </p:cNvPr>
+          <p:cNvSpPr txBox="1"/>
+          <p:nvPr/>
+        </p:nvSpPr>
+        <p:spPr>
+          <a:xfrm>
+            <a:off x="956863" y="6293193"/>
+            <a:ext cx="3468793" cy="369332"/>
+          </a:xfrm>
+          <a:prstGeom prst="rect">
+            <a:avLst/>
+          </a:prstGeom>
+          <a:noFill/>
+        </p:spPr>
+        <p:txBody>
+          <a:bodyPr wrap="square" rtlCol="0">
+            <a:spAutoFit/>
+          </a:bodyPr>
+          <a:lstStyle/>
+          <a:p>
+            <a:r>
+              <a:rPr lang="en-US" dirty="0"/>
+              <a:t>I. </a:t>
+            </a:r>
+            <a:r>
+              <a:rPr lang="en-US" dirty="0" err="1"/>
+              <a:t>Gerchberg</a:t>
+            </a:r>
+            <a:r>
+              <a:rPr lang="en-US" dirty="0"/>
+              <a:t>-Saxton Algorithm</a:t>
+            </a:r>
+          </a:p>
+        </p:txBody>
+      </p:sp>
+      <p:sp>
+        <p:nvSpPr>
+          <p:cNvPr id="18" name="Arrow: Down 17">
+            <a:extLst>
+              <a:ext uri="{FF2B5EF4-FFF2-40B4-BE49-F238E27FC236}">
+                <a16:creationId xmlns:a16="http://schemas.microsoft.com/office/drawing/2014/main" id="{1020E364-5C91-4107-85D9-02EAA6EC4F26}"/>
+              </a:ext>
+            </a:extLst>
+          </p:cNvPr>
+          <p:cNvSpPr/>
+          <p:nvPr/>
+        </p:nvSpPr>
+        <p:spPr>
+          <a:xfrm>
+            <a:off x="6131924" y="3033984"/>
+            <a:ext cx="330093" cy="960699"/>
+          </a:xfrm>
+          <a:prstGeom prst="downArrow">
+            <a:avLst/>
+          </a:prstGeom>
+        </p:spPr>
+        <p:style>
+          <a:lnRef idx="2">
+            <a:schemeClr val="accent2">
+              <a:shade val="50000"/>
+            </a:schemeClr>
+          </a:lnRef>
+          <a:fillRef idx="1">
+            <a:schemeClr val="accent2"/>
+          </a:fillRef>
+          <a:effectRef idx="0">
+            <a:schemeClr val="accent2"/>
+          </a:effectRef>
+          <a:fontRef idx="minor">
+            <a:schemeClr val="lt1"/>
+          </a:fontRef>
+        </p:style>
+        <p:txBody>
+          <a:bodyPr rtlCol="0" anchor="ctr"/>
+          <a:lstStyle/>
+          <a:p>
+            <a:pPr algn="ctr"/>
+            <a:endParaRPr lang="en-US"/>
+          </a:p>
+        </p:txBody>
+      </p:sp>
+      <p:sp>
+        <p:nvSpPr>
+          <p:cNvPr id="19" name="TextBox 18">
+            <a:extLst>
+              <a:ext uri="{FF2B5EF4-FFF2-40B4-BE49-F238E27FC236}">
+                <a16:creationId xmlns:a16="http://schemas.microsoft.com/office/drawing/2014/main" id="{8495A1A9-0D7D-40D2-A3DA-2D73799F9B1F}"/>
+              </a:ext>
+            </a:extLst>
+          </p:cNvPr>
+          <p:cNvSpPr txBox="1"/>
+          <p:nvPr/>
+        </p:nvSpPr>
+        <p:spPr>
+          <a:xfrm>
+            <a:off x="6560187" y="3392800"/>
+            <a:ext cx="763929" cy="369332"/>
+          </a:xfrm>
+          <a:prstGeom prst="rect">
+            <a:avLst/>
+          </a:prstGeom>
+          <a:noFill/>
+        </p:spPr>
+        <p:txBody>
+          <a:bodyPr wrap="square" rtlCol="0">
+            <a:spAutoFit/>
+          </a:bodyPr>
+          <a:lstStyle/>
+          <a:p>
+            <a:r>
+              <a:rPr lang="en-US" dirty="0"/>
+              <a:t>FFT</a:t>
+            </a:r>
+          </a:p>
+        </p:txBody>
+      </p:sp>
+      <p:sp>
+        <p:nvSpPr>
+          <p:cNvPr id="20" name="TextBox 19">
+            <a:extLst>
+              <a:ext uri="{FF2B5EF4-FFF2-40B4-BE49-F238E27FC236}">
+                <a16:creationId xmlns:a16="http://schemas.microsoft.com/office/drawing/2014/main" id="{D6EFF213-B86D-4F2D-8CF4-82DA2DC1540A}"/>
+              </a:ext>
+            </a:extLst>
+          </p:cNvPr>
+          <p:cNvSpPr txBox="1"/>
+          <p:nvPr/>
+        </p:nvSpPr>
+        <p:spPr>
+          <a:xfrm>
+            <a:off x="4727620" y="6292317"/>
+            <a:ext cx="3468793" cy="369332"/>
+          </a:xfrm>
+          <a:prstGeom prst="rect">
+            <a:avLst/>
+          </a:prstGeom>
+          <a:noFill/>
+        </p:spPr>
+        <p:txBody>
+          <a:bodyPr wrap="square" rtlCol="0">
+            <a:spAutoFit/>
+          </a:bodyPr>
+          <a:lstStyle/>
+          <a:p>
+            <a:r>
+              <a:rPr lang="en-US" dirty="0"/>
+              <a:t>II. Nearfield Phase Quantization</a:t>
+            </a:r>
+          </a:p>
+        </p:txBody>
+      </p:sp>
+      <p:sp>
+        <p:nvSpPr>
+          <p:cNvPr id="21" name="Arrow: Down 20">
+            <a:extLst>
+              <a:ext uri="{FF2B5EF4-FFF2-40B4-BE49-F238E27FC236}">
+                <a16:creationId xmlns:a16="http://schemas.microsoft.com/office/drawing/2014/main" id="{0DF59F43-AD54-425A-9864-66412E43BB2D}"/>
+              </a:ext>
+            </a:extLst>
+          </p:cNvPr>
+          <p:cNvSpPr/>
+          <p:nvPr/>
+        </p:nvSpPr>
+        <p:spPr>
+          <a:xfrm>
+            <a:off x="10022947" y="3070184"/>
+            <a:ext cx="330093" cy="960699"/>
+          </a:xfrm>
+          <a:prstGeom prst="downArrow">
+            <a:avLst/>
+          </a:prstGeom>
+        </p:spPr>
+        <p:style>
+          <a:lnRef idx="2">
+            <a:schemeClr val="accent2">
+              <a:shade val="50000"/>
+            </a:schemeClr>
+          </a:lnRef>
+          <a:fillRef idx="1">
+            <a:schemeClr val="accent2"/>
+          </a:fillRef>
+          <a:effectRef idx="0">
+            <a:schemeClr val="accent2"/>
+          </a:effectRef>
+          <a:fontRef idx="minor">
+            <a:schemeClr val="lt1"/>
+          </a:fontRef>
+        </p:style>
+        <p:txBody>
+          <a:bodyPr rtlCol="0" anchor="ctr"/>
+          <a:lstStyle/>
+          <a:p>
+            <a:pPr algn="ctr"/>
+            <a:endParaRPr lang="en-US"/>
+          </a:p>
+        </p:txBody>
+      </p:sp>
+      <p:sp>
+        <p:nvSpPr>
+          <p:cNvPr id="22" name="TextBox 21">
+            <a:extLst>
+              <a:ext uri="{FF2B5EF4-FFF2-40B4-BE49-F238E27FC236}">
+                <a16:creationId xmlns:a16="http://schemas.microsoft.com/office/drawing/2014/main" id="{A6E90C64-AE54-4F31-B48B-B0AE50E922B0}"/>
+              </a:ext>
+            </a:extLst>
+          </p:cNvPr>
+          <p:cNvSpPr txBox="1"/>
+          <p:nvPr/>
+        </p:nvSpPr>
+        <p:spPr>
+          <a:xfrm>
+            <a:off x="10451210" y="3429000"/>
+            <a:ext cx="763929" cy="369332"/>
+          </a:xfrm>
+          <a:prstGeom prst="rect">
+            <a:avLst/>
+          </a:prstGeom>
+          <a:noFill/>
+        </p:spPr>
+        <p:txBody>
+          <a:bodyPr wrap="square" rtlCol="0">
+            <a:spAutoFit/>
+          </a:bodyPr>
+          <a:lstStyle/>
+          <a:p>
+            <a:r>
+              <a:rPr lang="en-US" dirty="0"/>
+              <a:t>FFT</a:t>
+            </a:r>
+          </a:p>
+        </p:txBody>
+      </p:sp>
+      <p:sp>
+        <p:nvSpPr>
+          <p:cNvPr id="23" name="TextBox 22">
+            <a:extLst>
+              <a:ext uri="{FF2B5EF4-FFF2-40B4-BE49-F238E27FC236}">
+                <a16:creationId xmlns:a16="http://schemas.microsoft.com/office/drawing/2014/main" id="{C314B1A1-31B9-4C1F-AD48-9472A49C8A49}"/>
+              </a:ext>
+            </a:extLst>
+          </p:cNvPr>
+          <p:cNvSpPr txBox="1"/>
+          <p:nvPr/>
+        </p:nvSpPr>
+        <p:spPr>
+          <a:xfrm>
+            <a:off x="8618643" y="6203490"/>
+            <a:ext cx="3468793" cy="646331"/>
+          </a:xfrm>
+          <a:prstGeom prst="rect">
+            <a:avLst/>
+          </a:prstGeom>
+          <a:noFill/>
+        </p:spPr>
+        <p:txBody>
+          <a:bodyPr wrap="square" rtlCol="0">
+            <a:spAutoFit/>
+          </a:bodyPr>
+          <a:lstStyle/>
+          <a:p>
+            <a:r>
+              <a:rPr lang="en-US" dirty="0"/>
+              <a:t>III. Phase Modulated by Imaginary Gauge Field</a:t>
+            </a:r>
+          </a:p>
+        </p:txBody>
+      </p:sp>
+      <p:grpSp>
+        <p:nvGrpSpPr>
+          <p:cNvPr id="28" name="Group 27">
+            <a:extLst>
+              <a:ext uri="{FF2B5EF4-FFF2-40B4-BE49-F238E27FC236}">
+                <a16:creationId xmlns:a16="http://schemas.microsoft.com/office/drawing/2014/main" id="{08785675-C7B4-443D-9821-73BE2C7AF3E5}"/>
+              </a:ext>
+            </a:extLst>
+          </p:cNvPr>
+          <p:cNvGrpSpPr/>
+          <p:nvPr/>
+        </p:nvGrpSpPr>
+        <p:grpSpPr>
+          <a:xfrm>
+            <a:off x="8507611" y="392783"/>
+            <a:ext cx="3030671" cy="2607411"/>
+            <a:chOff x="8507611" y="392783"/>
+            <a:chExt cx="3030671" cy="2607411"/>
+          </a:xfrm>
+        </p:grpSpPr>
+        <p:pic>
+          <p:nvPicPr>
+            <p:cNvPr id="8" name="Picture 7">
+              <a:extLst>
+                <a:ext uri="{FF2B5EF4-FFF2-40B4-BE49-F238E27FC236}">
+                  <a16:creationId xmlns:a16="http://schemas.microsoft.com/office/drawing/2014/main" id="{3C08B563-D378-4757-9753-DEC5A4C94FC5}"/>
+                </a:ext>
+              </a:extLst>
+            </p:cNvPr>
+            <p:cNvPicPr>
+              <a:picLocks noChangeAspect="1"/>
+            </p:cNvPicPr>
+            <p:nvPr/>
+          </p:nvPicPr>
+          <p:blipFill>
+            <a:blip r:embed="rId8"/>
+            <a:stretch>
+              <a:fillRect/>
+            </a:stretch>
+          </p:blipFill>
+          <p:spPr>
+            <a:xfrm>
+              <a:off x="8507611" y="392783"/>
+              <a:ext cx="3030671" cy="2607411"/>
+            </a:xfrm>
+            <a:prstGeom prst="rect">
+              <a:avLst/>
+            </a:prstGeom>
+          </p:spPr>
+        </p:pic>
+        <p:sp>
+          <p:nvSpPr>
+            <p:cNvPr id="24" name="Rectangle 23">
+              <a:extLst>
+                <a:ext uri="{FF2B5EF4-FFF2-40B4-BE49-F238E27FC236}">
+                  <a16:creationId xmlns:a16="http://schemas.microsoft.com/office/drawing/2014/main" id="{B2406B91-443A-418F-8B2E-45B345842901}"/>
+                </a:ext>
+              </a:extLst>
+            </p:cNvPr>
+            <p:cNvSpPr/>
+            <p:nvPr/>
+          </p:nvSpPr>
+          <p:spPr>
+            <a:xfrm>
+              <a:off x="9306046" y="949124"/>
+              <a:ext cx="1551007" cy="1388962"/>
+            </a:xfrm>
+            <a:prstGeom prst="rect">
+              <a:avLst/>
+            </a:prstGeom>
+            <a:noFill/>
+            <a:ln w="38100">
+              <a:solidFill>
+                <a:schemeClr val="tx1"/>
+              </a:solidFill>
+            </a:ln>
+          </p:spPr>
+          <p:style>
+            <a:lnRef idx="2">
+              <a:schemeClr val="accent1">
+                <a:shade val="50000"/>
+              </a:schemeClr>
+            </a:lnRef>
+            <a:fillRef idx="1">
+              <a:schemeClr val="accent1"/>
+            </a:fillRef>
+            <a:effectRef idx="0">
+              <a:schemeClr val="accent1"/>
+            </a:effectRef>
+            <a:fontRef idx="minor">
+              <a:schemeClr val="lt1"/>
+            </a:fontRef>
+          </p:style>
+          <p:txBody>
+            <a:bodyPr rtlCol="0" anchor="ctr"/>
+            <a:lstStyle/>
+            <a:p>
+              <a:pPr algn="ctr"/>
+              <a:endParaRPr lang="en-US"/>
+            </a:p>
+          </p:txBody>
+        </p:sp>
+        <p:sp>
+          <p:nvSpPr>
+            <p:cNvPr id="25" name="Rectangle 24">
+              <a:extLst>
+                <a:ext uri="{FF2B5EF4-FFF2-40B4-BE49-F238E27FC236}">
+                  <a16:creationId xmlns:a16="http://schemas.microsoft.com/office/drawing/2014/main" id="{DC3A0DA2-4F9B-4BA9-BA27-A659CF250AE4}"/>
+                </a:ext>
+              </a:extLst>
+            </p:cNvPr>
+            <p:cNvSpPr/>
+            <p:nvPr/>
+          </p:nvSpPr>
+          <p:spPr>
+            <a:xfrm>
+              <a:off x="9458447" y="1101524"/>
+              <a:ext cx="1236562" cy="1107369"/>
+            </a:xfrm>
+            <a:prstGeom prst="rect">
+              <a:avLst/>
+            </a:prstGeom>
+            <a:noFill/>
+            <a:ln w="38100">
+              <a:solidFill>
+                <a:schemeClr val="tx1"/>
+              </a:solidFill>
+            </a:ln>
+          </p:spPr>
+          <p:style>
+            <a:lnRef idx="2">
+              <a:schemeClr val="accent1">
+                <a:shade val="50000"/>
+              </a:schemeClr>
+            </a:lnRef>
+            <a:fillRef idx="1">
+              <a:schemeClr val="accent1"/>
+            </a:fillRef>
+            <a:effectRef idx="0">
+              <a:schemeClr val="accent1"/>
+            </a:effectRef>
+            <a:fontRef idx="minor">
+              <a:schemeClr val="lt1"/>
+            </a:fontRef>
+          </p:style>
+          <p:txBody>
+            <a:bodyPr rtlCol="0" anchor="ctr"/>
+            <a:lstStyle/>
+            <a:p>
+              <a:pPr algn="ctr"/>
+              <a:endParaRPr lang="en-US"/>
+            </a:p>
+          </p:txBody>
+        </p:sp>
+      </p:grpSp>
+      <p:sp>
+        <p:nvSpPr>
+          <p:cNvPr id="26" name="TextBox 25">
+            <a:extLst>
+              <a:ext uri="{FF2B5EF4-FFF2-40B4-BE49-F238E27FC236}">
+                <a16:creationId xmlns:a16="http://schemas.microsoft.com/office/drawing/2014/main" id="{BC52F448-F970-4F18-A4C5-D77990168237}"/>
+              </a:ext>
+            </a:extLst>
+          </p:cNvPr>
+          <p:cNvSpPr txBox="1"/>
+          <p:nvPr/>
+        </p:nvSpPr>
+        <p:spPr>
+          <a:xfrm>
+            <a:off x="3794996" y="106087"/>
+            <a:ext cx="4401417" cy="461665"/>
+          </a:xfrm>
+          <a:prstGeom prst="rect">
+            <a:avLst/>
+          </a:prstGeom>
+          <a:noFill/>
+        </p:spPr>
+        <p:txBody>
+          <a:bodyPr wrap="square" rtlCol="0">
+            <a:spAutoFit/>
+          </a:bodyPr>
+          <a:lstStyle/>
+          <a:p>
+            <a:r>
+              <a:rPr lang="en-US" sz="2400" b="1" dirty="0"/>
+              <a:t>Full Flow of the Inverse Design</a:t>
+            </a:r>
+          </a:p>
+        </p:txBody>
+      </p:sp>
+    </p:spTree>
+    <p:extLst>
+      <p:ext uri="{BB962C8B-B14F-4D97-AF65-F5344CB8AC3E}">
+        <p14:creationId xmlns:p14="http://schemas.microsoft.com/office/powerpoint/2010/main" val="3179516829"/>
+      </p:ext>
+    </p:extLst>
+  </p:cSld>
+  <p:clrMapOvr>
+    <a:masterClrMapping/>
+  </p:clrMapOvr>
+</p:sld>
+</file>
+
 <file path=ppt/theme/theme1.xml><?xml version="1.0" encoding="utf-8"?>
 <a:theme xmlns:a="http://schemas.openxmlformats.org/drawingml/2006/main" name="Office Theme">
   <a:themeElements>

</xml_diff>